<commit_message>
inputted lattices into presentation
</commit_message>
<xml_diff>
--- a/Presentation.ppt.pptx
+++ b/Presentation.ppt.pptx
@@ -15,6 +15,9 @@
     <p:sldId id="265" r:id="rId9"/>
     <p:sldId id="267" r:id="rId10"/>
     <p:sldId id="266" r:id="rId11"/>
+    <p:sldId id="268" r:id="rId12"/>
+    <p:sldId id="269" r:id="rId13"/>
+    <p:sldId id="270" r:id="rId14"/>
   </p:sldIdLst>
   <p:sldSz cx="12192000" cy="6858000"/>
   <p:notesSz cx="6858000" cy="9144000"/>
@@ -115,7 +118,7 @@
   </p:defaultTextStyle>
   <p:extLst>
     <p:ext uri="{EFAFB233-063F-42B5-8137-9DF3F51BA10A}">
-      <p15:sldGuideLst xmlns:p15="http://schemas.microsoft.com/office/powerpoint/2012/main" xmlns="">
+      <p15:sldGuideLst xmlns:p15="http://schemas.microsoft.com/office/powerpoint/2012/main">
         <p15:guide id="1" orient="horz" pos="2160">
           <p15:clr>
             <a:srgbClr val="A4A3A4"/>
@@ -257,7 +260,7 @@
           <a:p>
             <a:fld id="{0A2C9084-70B7-4828-AD77-7D77F1A8B45B}" type="datetimeFigureOut">
               <a:rPr lang="en-US" smtClean="0"/>
-              <a:t>11/29/15</a:t>
+              <a:t>12/1/2015</a:t>
             </a:fld>
             <a:endParaRPr lang="en-US"/>
           </a:p>
@@ -890,7 +893,7 @@
           <a:p>
             <a:fld id="{0A2C9084-70B7-4828-AD77-7D77F1A8B45B}" type="datetimeFigureOut">
               <a:rPr lang="en-US" smtClean="0"/>
-              <a:t>11/29/15</a:t>
+              <a:t>12/1/2015</a:t>
             </a:fld>
             <a:endParaRPr lang="en-US"/>
           </a:p>
@@ -1167,7 +1170,7 @@
           <a:p>
             <a:fld id="{0A2C9084-70B7-4828-AD77-7D77F1A8B45B}" type="datetimeFigureOut">
               <a:rPr lang="en-US" smtClean="0"/>
-              <a:t>11/29/15</a:t>
+              <a:t>12/1/2015</a:t>
             </a:fld>
             <a:endParaRPr lang="en-US"/>
           </a:p>
@@ -1332,7 +1335,7 @@
           <a:p>
             <a:fld id="{0A2C9084-70B7-4828-AD77-7D77F1A8B45B}" type="datetimeFigureOut">
               <a:rPr lang="en-US" smtClean="0"/>
-              <a:t>11/29/15</a:t>
+              <a:t>12/1/2015</a:t>
             </a:fld>
             <a:endParaRPr lang="en-US"/>
           </a:p>
@@ -1513,7 +1516,7 @@
           <a:p>
             <a:fld id="{0A2C9084-70B7-4828-AD77-7D77F1A8B45B}" type="datetimeFigureOut">
               <a:rPr lang="en-US" smtClean="0"/>
-              <a:t>11/29/15</a:t>
+              <a:t>12/1/2015</a:t>
             </a:fld>
             <a:endParaRPr lang="en-US"/>
           </a:p>
@@ -2158,7 +2161,7 @@
           <a:p>
             <a:fld id="{0A2C9084-70B7-4828-AD77-7D77F1A8B45B}" type="datetimeFigureOut">
               <a:rPr lang="en-US" smtClean="0"/>
-              <a:t>11/29/15</a:t>
+              <a:t>12/1/2015</a:t>
             </a:fld>
             <a:endParaRPr lang="en-US"/>
           </a:p>
@@ -2584,7 +2587,7 @@
           <a:p>
             <a:fld id="{0A2C9084-70B7-4828-AD77-7D77F1A8B45B}" type="datetimeFigureOut">
               <a:rPr lang="en-US" smtClean="0"/>
-              <a:t>11/29/15</a:t>
+              <a:t>12/1/2015</a:t>
             </a:fld>
             <a:endParaRPr lang="en-US"/>
           </a:p>
@@ -2697,7 +2700,7 @@
           <a:p>
             <a:fld id="{0A2C9084-70B7-4828-AD77-7D77F1A8B45B}" type="datetimeFigureOut">
               <a:rPr lang="en-US" smtClean="0"/>
-              <a:t>11/29/15</a:t>
+              <a:t>12/1/2015</a:t>
             </a:fld>
             <a:endParaRPr lang="en-US"/>
           </a:p>
@@ -2878,7 +2881,7 @@
           <a:p>
             <a:fld id="{0A2C9084-70B7-4828-AD77-7D77F1A8B45B}" type="datetimeFigureOut">
               <a:rPr lang="en-US" smtClean="0"/>
-              <a:t>11/29/15</a:t>
+              <a:t>12/1/2015</a:t>
             </a:fld>
             <a:endParaRPr lang="en-US"/>
           </a:p>
@@ -3144,7 +3147,7 @@
           <a:p>
             <a:fld id="{0A2C9084-70B7-4828-AD77-7D77F1A8B45B}" type="datetimeFigureOut">
               <a:rPr lang="en-US" smtClean="0"/>
-              <a:t>11/29/15</a:t>
+              <a:t>12/1/2015</a:t>
             </a:fld>
             <a:endParaRPr lang="en-US"/>
           </a:p>
@@ -3614,7 +3617,7 @@
           <a:p>
             <a:fld id="{0A2C9084-70B7-4828-AD77-7D77F1A8B45B}" type="datetimeFigureOut">
               <a:rPr lang="en-US" smtClean="0"/>
-              <a:t>11/29/15</a:t>
+              <a:t>12/1/2015</a:t>
             </a:fld>
             <a:endParaRPr lang="en-US"/>
           </a:p>
@@ -4174,7 +4177,7 @@
           <a:p>
             <a:fld id="{0A2C9084-70B7-4828-AD77-7D77F1A8B45B}" type="datetimeFigureOut">
               <a:rPr lang="en-US" smtClean="0"/>
-              <a:t>11/29/15</a:t>
+              <a:t>12/1/2015</a:t>
             </a:fld>
             <a:endParaRPr lang="en-US"/>
           </a:p>
@@ -4831,7 +4834,7 @@
   <p:timing>
     <p:tnLst>
       <p:par>
-        <p:cTn xmlns:p14="http://schemas.microsoft.com/office/powerpoint/2010/main" id="1" dur="indefinite" restart="never" nodeType="tmRoot"/>
+        <p:cTn id="1" dur="indefinite" restart="never" nodeType="tmRoot"/>
       </p:par>
     </p:tnLst>
   </p:timing>
@@ -4930,10 +4933,790 @@
   <p:timing>
     <p:tnLst>
       <p:par>
-        <p:cTn xmlns:p14="http://schemas.microsoft.com/office/powerpoint/2010/main" id="1" dur="indefinite" restart="never" nodeType="tmRoot"/>
+        <p:cTn id="1" dur="indefinite" restart="never" nodeType="tmRoot"/>
       </p:par>
     </p:tnLst>
   </p:timing>
+</p:sld>
+</file>
+
+<file path=ppt/slides/slide11.xml><?xml version="1.0" encoding="utf-8"?>
+<p:sld xmlns:a="http://schemas.openxmlformats.org/drawingml/2006/main" xmlns:r="http://schemas.openxmlformats.org/officeDocument/2006/relationships" xmlns:p="http://schemas.openxmlformats.org/presentationml/2006/main">
+  <p:cSld>
+    <p:spTree>
+      <p:nvGrpSpPr>
+        <p:cNvPr id="1" name=""/>
+        <p:cNvGrpSpPr/>
+        <p:nvPr/>
+      </p:nvGrpSpPr>
+      <p:grpSpPr>
+        <a:xfrm>
+          <a:off x="0" y="0"/>
+          <a:ext cx="0" cy="0"/>
+          <a:chOff x="0" y="0"/>
+          <a:chExt cx="0" cy="0"/>
+        </a:xfrm>
+      </p:grpSpPr>
+      <p:sp>
+        <p:nvSpPr>
+          <p:cNvPr id="2" name="Title 1"/>
+          <p:cNvSpPr>
+            <a:spLocks noGrp="1"/>
+          </p:cNvSpPr>
+          <p:nvPr>
+            <p:ph type="title"/>
+          </p:nvPr>
+        </p:nvSpPr>
+        <p:spPr/>
+        <p:txBody>
+          <a:bodyPr/>
+          <a:lstStyle/>
+          <a:p>
+            <a:r>
+              <a:rPr lang="en-US" dirty="0" smtClean="0"/>
+              <a:t>Complex Lattices </a:t>
+            </a:r>
+            <a:endParaRPr lang="en-US" dirty="0"/>
+          </a:p>
+        </p:txBody>
+      </p:sp>
+      <p:sp>
+        <p:nvSpPr>
+          <p:cNvPr id="3" name="Content Placeholder 2"/>
+          <p:cNvSpPr>
+            <a:spLocks noGrp="1"/>
+          </p:cNvSpPr>
+          <p:nvPr>
+            <p:ph idx="1"/>
+          </p:nvPr>
+        </p:nvSpPr>
+        <p:spPr/>
+        <p:txBody>
+          <a:bodyPr/>
+          <a:lstStyle/>
+          <a:p>
+            <a:pPr marL="114300" indent="0">
+              <a:buNone/>
+            </a:pPr>
+            <a:r>
+              <a:rPr lang="en-US" dirty="0" smtClean="0"/>
+              <a:t>All elliptic curves are lattices, i.e. </a:t>
+            </a:r>
+            <a:endParaRPr lang="en-US" dirty="0"/>
+          </a:p>
+        </p:txBody>
+      </p:sp>
+      <p:pic>
+        <p:nvPicPr>
+          <p:cNvPr id="5" name="Picture 4"/>
+          <p:cNvPicPr>
+            <a:picLocks noChangeAspect="1"/>
+          </p:cNvPicPr>
+          <p:nvPr>
+            <p:custDataLst>
+              <p:tags r:id="rId1"/>
+            </p:custDataLst>
+          </p:nvPr>
+        </p:nvPicPr>
+        <p:blipFill>
+          <a:blip r:embed="rId8" cstate="print">
+            <a:extLst>
+              <a:ext uri="{28A0092B-C50C-407E-A947-70E740481C1C}">
+                <a14:useLocalDpi xmlns:a14="http://schemas.microsoft.com/office/drawing/2010/main" val="0"/>
+              </a:ext>
+            </a:extLst>
+          </a:blip>
+          <a:stretch>
+            <a:fillRect/>
+          </a:stretch>
+        </p:blipFill>
+        <p:spPr>
+          <a:xfrm>
+            <a:off x="811815" y="2363698"/>
+            <a:ext cx="6777228" cy="998220"/>
+          </a:xfrm>
+          <a:prstGeom prst="rect">
+            <a:avLst/>
+          </a:prstGeom>
+        </p:spPr>
+      </p:pic>
+      <p:sp>
+        <p:nvSpPr>
+          <p:cNvPr id="6" name="Rectangle 5"/>
+          <p:cNvSpPr/>
+          <p:nvPr/>
+        </p:nvSpPr>
+        <p:spPr>
+          <a:xfrm>
+            <a:off x="185660" y="1752601"/>
+            <a:ext cx="11779249" cy="5016500"/>
+          </a:xfrm>
+          <a:prstGeom prst="rect">
+            <a:avLst/>
+          </a:prstGeom>
+          <a:solidFill>
+            <a:schemeClr val="bg1"/>
+          </a:solidFill>
+          <a:ln>
+            <a:solidFill>
+              <a:srgbClr val="F7F7F7"/>
+            </a:solidFill>
+          </a:ln>
+          <a:effectLst/>
+        </p:spPr>
+        <p:style>
+          <a:lnRef idx="1">
+            <a:schemeClr val="accent1"/>
+          </a:lnRef>
+          <a:fillRef idx="3">
+            <a:schemeClr val="accent1"/>
+          </a:fillRef>
+          <a:effectRef idx="2">
+            <a:schemeClr val="accent1"/>
+          </a:effectRef>
+          <a:fontRef idx="minor">
+            <a:schemeClr val="lt1"/>
+          </a:fontRef>
+        </p:style>
+        <p:txBody>
+          <a:bodyPr rtlCol="0" anchor="ctr"/>
+          <a:lstStyle/>
+          <a:p>
+            <a:pPr algn="ctr"/>
+            <a:endParaRPr lang="en-US"/>
+          </a:p>
+        </p:txBody>
+      </p:sp>
+      <p:pic>
+        <p:nvPicPr>
+          <p:cNvPr id="7" name="Picture 6"/>
+          <p:cNvPicPr>
+            <a:picLocks noChangeAspect="1"/>
+          </p:cNvPicPr>
+          <p:nvPr>
+            <p:custDataLst>
+              <p:tags r:id="rId2"/>
+            </p:custDataLst>
+          </p:nvPr>
+        </p:nvPicPr>
+        <p:blipFill>
+          <a:blip r:embed="rId8" cstate="print">
+            <a:extLst>
+              <a:ext uri="{28A0092B-C50C-407E-A947-70E740481C1C}">
+                <a14:useLocalDpi xmlns:a14="http://schemas.microsoft.com/office/drawing/2010/main" val="0"/>
+              </a:ext>
+            </a:extLst>
+          </a:blip>
+          <a:stretch>
+            <a:fillRect/>
+          </a:stretch>
+        </p:blipFill>
+        <p:spPr>
+          <a:xfrm>
+            <a:off x="429306" y="2058897"/>
+            <a:ext cx="6777228" cy="998220"/>
+          </a:xfrm>
+          <a:prstGeom prst="rect">
+            <a:avLst/>
+          </a:prstGeom>
+        </p:spPr>
+      </p:pic>
+      <p:pic>
+        <p:nvPicPr>
+          <p:cNvPr id="8" name="Picture 2" descr="https://upload.wikimedia.org/wikipedia/commons/d/db/Fundamental_parallelogram.png"/>
+          <p:cNvPicPr>
+            <a:picLocks noChangeAspect="1" noChangeArrowheads="1"/>
+          </p:cNvPicPr>
+          <p:nvPr/>
+        </p:nvPicPr>
+        <p:blipFill>
+          <a:blip r:embed="rId9">
+            <a:extLst>
+              <a:ext uri="{28A0092B-C50C-407E-A947-70E740481C1C}">
+                <a14:useLocalDpi xmlns:a14="http://schemas.microsoft.com/office/drawing/2010/main" val="0"/>
+              </a:ext>
+            </a:extLst>
+          </a:blip>
+          <a:srcRect/>
+          <a:stretch>
+            <a:fillRect/>
+          </a:stretch>
+        </p:blipFill>
+        <p:spPr bwMode="auto">
+          <a:xfrm>
+            <a:off x="8863739" y="1874723"/>
+            <a:ext cx="2718661" cy="1976170"/>
+          </a:xfrm>
+          <a:prstGeom prst="rect">
+            <a:avLst/>
+          </a:prstGeom>
+          <a:noFill/>
+          <a:extLst>
+            <a:ext uri="{909E8E84-426E-40DD-AFC4-6F175D3DCCD1}">
+              <a14:hiddenFill xmlns:a14="http://schemas.microsoft.com/office/drawing/2010/main">
+                <a:solidFill>
+                  <a:srgbClr val="FFFFFF"/>
+                </a:solidFill>
+              </a14:hiddenFill>
+            </a:ext>
+          </a:extLst>
+        </p:spPr>
+      </p:pic>
+      <p:pic>
+        <p:nvPicPr>
+          <p:cNvPr id="9" name="Picture 8"/>
+          <p:cNvPicPr>
+            <a:picLocks noChangeAspect="1"/>
+          </p:cNvPicPr>
+          <p:nvPr>
+            <p:custDataLst>
+              <p:tags r:id="rId3"/>
+            </p:custDataLst>
+          </p:nvPr>
+        </p:nvPicPr>
+        <p:blipFill>
+          <a:blip r:embed="rId10" cstate="print">
+            <a:extLst>
+              <a:ext uri="{28A0092B-C50C-407E-A947-70E740481C1C}">
+                <a14:useLocalDpi xmlns:a14="http://schemas.microsoft.com/office/drawing/2010/main" val="0"/>
+              </a:ext>
+            </a:extLst>
+          </a:blip>
+          <a:stretch>
+            <a:fillRect/>
+          </a:stretch>
+        </p:blipFill>
+        <p:spPr>
+          <a:xfrm>
+            <a:off x="568171" y="3252093"/>
+            <a:ext cx="2965704" cy="252984"/>
+          </a:xfrm>
+          <a:prstGeom prst="rect">
+            <a:avLst/>
+          </a:prstGeom>
+        </p:spPr>
+      </p:pic>
+      <p:pic>
+        <p:nvPicPr>
+          <p:cNvPr id="10" name="Picture 9"/>
+          <p:cNvPicPr>
+            <a:picLocks noChangeAspect="1"/>
+          </p:cNvPicPr>
+          <p:nvPr>
+            <p:custDataLst>
+              <p:tags r:id="rId4"/>
+            </p:custDataLst>
+          </p:nvPr>
+        </p:nvPicPr>
+        <p:blipFill>
+          <a:blip r:embed="rId11" cstate="print">
+            <a:extLst>
+              <a:ext uri="{28A0092B-C50C-407E-A947-70E740481C1C}">
+                <a14:useLocalDpi xmlns:a14="http://schemas.microsoft.com/office/drawing/2010/main" val="0"/>
+              </a:ext>
+            </a:extLst>
+          </a:blip>
+          <a:stretch>
+            <a:fillRect/>
+          </a:stretch>
+        </p:blipFill>
+        <p:spPr>
+          <a:xfrm>
+            <a:off x="429306" y="3745177"/>
+            <a:ext cx="3683508" cy="455676"/>
+          </a:xfrm>
+          <a:prstGeom prst="rect">
+            <a:avLst/>
+          </a:prstGeom>
+        </p:spPr>
+      </p:pic>
+      <p:pic>
+        <p:nvPicPr>
+          <p:cNvPr id="11" name="Picture 10"/>
+          <p:cNvPicPr>
+            <a:picLocks noChangeAspect="1"/>
+          </p:cNvPicPr>
+          <p:nvPr>
+            <p:custDataLst>
+              <p:tags r:id="rId5"/>
+            </p:custDataLst>
+          </p:nvPr>
+        </p:nvPicPr>
+        <p:blipFill>
+          <a:blip r:embed="rId12" cstate="print">
+            <a:extLst>
+              <a:ext uri="{28A0092B-C50C-407E-A947-70E740481C1C}">
+                <a14:useLocalDpi xmlns:a14="http://schemas.microsoft.com/office/drawing/2010/main" val="0"/>
+              </a:ext>
+            </a:extLst>
+          </a:blip>
+          <a:stretch>
+            <a:fillRect/>
+          </a:stretch>
+        </p:blipFill>
+        <p:spPr>
+          <a:xfrm>
+            <a:off x="4548678" y="3850893"/>
+            <a:ext cx="2657856" cy="348996"/>
+          </a:xfrm>
+          <a:prstGeom prst="rect">
+            <a:avLst/>
+          </a:prstGeom>
+        </p:spPr>
+      </p:pic>
+      <p:pic>
+        <p:nvPicPr>
+          <p:cNvPr id="12" name="Picture 11"/>
+          <p:cNvPicPr>
+            <a:picLocks noChangeAspect="1"/>
+          </p:cNvPicPr>
+          <p:nvPr>
+            <p:custDataLst>
+              <p:tags r:id="rId6"/>
+            </p:custDataLst>
+          </p:nvPr>
+        </p:nvPicPr>
+        <p:blipFill>
+          <a:blip r:embed="rId13" cstate="print">
+            <a:extLst>
+              <a:ext uri="{28A0092B-C50C-407E-A947-70E740481C1C}">
+                <a14:useLocalDpi xmlns:a14="http://schemas.microsoft.com/office/drawing/2010/main" val="0"/>
+              </a:ext>
+            </a:extLst>
+          </a:blip>
+          <a:stretch>
+            <a:fillRect/>
+          </a:stretch>
+        </p:blipFill>
+        <p:spPr>
+          <a:xfrm>
+            <a:off x="429306" y="4491057"/>
+            <a:ext cx="6352032" cy="252984"/>
+          </a:xfrm>
+          <a:prstGeom prst="rect">
+            <a:avLst/>
+          </a:prstGeom>
+        </p:spPr>
+      </p:pic>
+    </p:spTree>
+    <p:extLst>
+      <p:ext uri="{BB962C8B-B14F-4D97-AF65-F5344CB8AC3E}">
+        <p14:creationId xmlns:p14="http://schemas.microsoft.com/office/powerpoint/2010/main" val="2895263840"/>
+      </p:ext>
+    </p:extLst>
+  </p:cSld>
+  <p:clrMapOvr>
+    <a:masterClrMapping/>
+  </p:clrMapOvr>
+</p:sld>
+</file>
+
+<file path=ppt/slides/slide12.xml><?xml version="1.0" encoding="utf-8"?>
+<p:sld xmlns:a="http://schemas.openxmlformats.org/drawingml/2006/main" xmlns:r="http://schemas.openxmlformats.org/officeDocument/2006/relationships" xmlns:p="http://schemas.openxmlformats.org/presentationml/2006/main">
+  <p:cSld>
+    <p:spTree>
+      <p:nvGrpSpPr>
+        <p:cNvPr id="1" name=""/>
+        <p:cNvGrpSpPr/>
+        <p:nvPr/>
+      </p:nvGrpSpPr>
+      <p:grpSpPr>
+        <a:xfrm>
+          <a:off x="0" y="0"/>
+          <a:ext cx="0" cy="0"/>
+          <a:chOff x="0" y="0"/>
+          <a:chExt cx="0" cy="0"/>
+        </a:xfrm>
+      </p:grpSpPr>
+      <p:sp>
+        <p:nvSpPr>
+          <p:cNvPr id="2" name="Title 1"/>
+          <p:cNvSpPr>
+            <a:spLocks noGrp="1"/>
+          </p:cNvSpPr>
+          <p:nvPr>
+            <p:ph type="title"/>
+          </p:nvPr>
+        </p:nvSpPr>
+        <p:spPr/>
+        <p:txBody>
+          <a:bodyPr/>
+          <a:lstStyle/>
+          <a:p>
+            <a:r>
+              <a:rPr lang="en-US" dirty="0" smtClean="0"/>
+              <a:t>Complex Multiplication</a:t>
+            </a:r>
+            <a:endParaRPr lang="en-US" dirty="0"/>
+          </a:p>
+        </p:txBody>
+      </p:sp>
+      <p:sp>
+        <p:nvSpPr>
+          <p:cNvPr id="12" name="Content Placeholder 11"/>
+          <p:cNvSpPr>
+            <a:spLocks noGrp="1"/>
+          </p:cNvSpPr>
+          <p:nvPr>
+            <p:ph idx="1"/>
+          </p:nvPr>
+        </p:nvSpPr>
+        <p:spPr>
+          <a:xfrm>
+            <a:off x="0" y="1752601"/>
+            <a:ext cx="12192000" cy="4958442"/>
+          </a:xfrm>
+          <a:prstGeom prst="rect">
+            <a:avLst/>
+          </a:prstGeom>
+          <a:solidFill>
+            <a:schemeClr val="bg1"/>
+          </a:solidFill>
+          <a:ln>
+            <a:solidFill>
+              <a:srgbClr val="F7F7F7"/>
+            </a:solidFill>
+          </a:ln>
+          <a:effectLst/>
+        </p:spPr>
+        <p:style>
+          <a:lnRef idx="1">
+            <a:schemeClr val="accent1"/>
+          </a:lnRef>
+          <a:fillRef idx="3">
+            <a:schemeClr val="accent1"/>
+          </a:fillRef>
+          <a:effectRef idx="2">
+            <a:schemeClr val="accent1"/>
+          </a:effectRef>
+          <a:fontRef idx="minor">
+            <a:schemeClr val="lt1"/>
+          </a:fontRef>
+        </p:style>
+        <p:txBody>
+          <a:bodyPr rtlCol="0" anchor="ctr"/>
+          <a:lstStyle/>
+          <a:p>
+            <a:endParaRPr lang="en-US"/>
+          </a:p>
+        </p:txBody>
+      </p:sp>
+      <p:pic>
+        <p:nvPicPr>
+          <p:cNvPr id="13" name="Content Placeholder 3"/>
+          <p:cNvPicPr>
+            <a:picLocks noChangeAspect="1"/>
+          </p:cNvPicPr>
+          <p:nvPr>
+            <p:custDataLst>
+              <p:tags r:id="rId1"/>
+            </p:custDataLst>
+          </p:nvPr>
+        </p:nvPicPr>
+        <p:blipFill>
+          <a:blip r:embed="rId4" cstate="print">
+            <a:extLst>
+              <a:ext uri="{28A0092B-C50C-407E-A947-70E740481C1C}">
+                <a14:useLocalDpi xmlns:a14="http://schemas.microsoft.com/office/drawing/2010/main" val="0"/>
+              </a:ext>
+            </a:extLst>
+          </a:blip>
+          <a:stretch>
+            <a:fillRect/>
+          </a:stretch>
+        </p:blipFill>
+        <p:spPr>
+          <a:xfrm>
+            <a:off x="817485" y="2041171"/>
+            <a:ext cx="10515600" cy="418807"/>
+          </a:xfrm>
+          <a:prstGeom prst="rect">
+            <a:avLst/>
+          </a:prstGeom>
+        </p:spPr>
+      </p:pic>
+      <p:sp>
+        <p:nvSpPr>
+          <p:cNvPr id="14" name="Rectangle 13"/>
+          <p:cNvSpPr/>
+          <p:nvPr/>
+        </p:nvSpPr>
+        <p:spPr>
+          <a:xfrm>
+            <a:off x="691243" y="2661556"/>
+            <a:ext cx="10891157" cy="1384995"/>
+          </a:xfrm>
+          <a:prstGeom prst="rect">
+            <a:avLst/>
+          </a:prstGeom>
+        </p:spPr>
+        <p:txBody>
+          <a:bodyPr wrap="square">
+            <a:spAutoFit/>
+          </a:bodyPr>
+          <a:lstStyle/>
+          <a:p>
+            <a:r>
+              <a:rPr lang="en-US" sz="2800" dirty="0">
+                <a:latin typeface="Cambria Math" panose="02040503050406030204" pitchFamily="18" charset="0"/>
+                <a:ea typeface="Cambria Math" panose="02040503050406030204" pitchFamily="18" charset="0"/>
+                <a:cs typeface="Times New Roman" panose="02020603050405020304" pitchFamily="18" charset="0"/>
+              </a:rPr>
+              <a:t>Note that this gives us a natural way to turn whatever algebraic transformations we have in the complex lattice to transformations on the elliptic curve points. For example</a:t>
+            </a:r>
+            <a:r>
+              <a:rPr lang="en-US" sz="2800" dirty="0">
+                <a:latin typeface="Times New Roman" panose="02020603050405020304" pitchFamily="18" charset="0"/>
+                <a:cs typeface="Times New Roman" panose="02020603050405020304" pitchFamily="18" charset="0"/>
+              </a:rPr>
+              <a:t>, </a:t>
+            </a:r>
+          </a:p>
+        </p:txBody>
+      </p:sp>
+      <p:pic>
+        <p:nvPicPr>
+          <p:cNvPr id="15" name="Content Placeholder 7"/>
+          <p:cNvPicPr>
+            <a:picLocks noChangeAspect="1"/>
+          </p:cNvPicPr>
+          <p:nvPr>
+            <p:custDataLst>
+              <p:tags r:id="rId2"/>
+            </p:custDataLst>
+          </p:nvPr>
+        </p:nvPicPr>
+        <p:blipFill>
+          <a:blip r:embed="rId5" cstate="print">
+            <a:extLst>
+              <a:ext uri="{28A0092B-C50C-407E-A947-70E740481C1C}">
+                <a14:useLocalDpi xmlns:a14="http://schemas.microsoft.com/office/drawing/2010/main" val="0"/>
+              </a:ext>
+            </a:extLst>
+          </a:blip>
+          <a:stretch>
+            <a:fillRect/>
+          </a:stretch>
+        </p:blipFill>
+        <p:spPr>
+          <a:xfrm>
+            <a:off x="691244" y="4195786"/>
+            <a:ext cx="7505700" cy="408872"/>
+          </a:xfrm>
+          <a:prstGeom prst="rect">
+            <a:avLst/>
+          </a:prstGeom>
+        </p:spPr>
+      </p:pic>
+      <p:pic>
+        <p:nvPicPr>
+          <p:cNvPr id="16" name="Picture 15"/>
+          <p:cNvPicPr>
+            <a:picLocks noChangeAspect="1"/>
+          </p:cNvPicPr>
+          <p:nvPr/>
+        </p:nvPicPr>
+        <p:blipFill>
+          <a:blip r:embed="rId6"/>
+          <a:stretch>
+            <a:fillRect/>
+          </a:stretch>
+        </p:blipFill>
+        <p:spPr>
+          <a:xfrm>
+            <a:off x="691243" y="4868515"/>
+            <a:ext cx="7097486" cy="427069"/>
+          </a:xfrm>
+          <a:prstGeom prst="rect">
+            <a:avLst/>
+          </a:prstGeom>
+        </p:spPr>
+      </p:pic>
+    </p:spTree>
+    <p:extLst>
+      <p:ext uri="{BB962C8B-B14F-4D97-AF65-F5344CB8AC3E}">
+        <p14:creationId xmlns:p14="http://schemas.microsoft.com/office/powerpoint/2010/main" val="1294897265"/>
+      </p:ext>
+    </p:extLst>
+  </p:cSld>
+  <p:clrMapOvr>
+    <a:masterClrMapping/>
+  </p:clrMapOvr>
+</p:sld>
+</file>
+
+<file path=ppt/slides/slide13.xml><?xml version="1.0" encoding="utf-8"?>
+<p:sld xmlns:a="http://schemas.openxmlformats.org/drawingml/2006/main" xmlns:r="http://schemas.openxmlformats.org/officeDocument/2006/relationships" xmlns:p="http://schemas.openxmlformats.org/presentationml/2006/main">
+  <p:cSld>
+    <p:spTree>
+      <p:nvGrpSpPr>
+        <p:cNvPr id="1" name=""/>
+        <p:cNvGrpSpPr/>
+        <p:nvPr/>
+      </p:nvGrpSpPr>
+      <p:grpSpPr>
+        <a:xfrm>
+          <a:off x="0" y="0"/>
+          <a:ext cx="0" cy="0"/>
+          <a:chOff x="0" y="0"/>
+          <a:chExt cx="0" cy="0"/>
+        </a:xfrm>
+      </p:grpSpPr>
+      <p:sp>
+        <p:nvSpPr>
+          <p:cNvPr id="2" name="Title 1"/>
+          <p:cNvSpPr>
+            <a:spLocks noGrp="1"/>
+          </p:cNvSpPr>
+          <p:nvPr>
+            <p:ph type="title"/>
+          </p:nvPr>
+        </p:nvSpPr>
+        <p:spPr/>
+        <p:txBody>
+          <a:bodyPr/>
+          <a:lstStyle/>
+          <a:p>
+            <a:r>
+              <a:rPr lang="en-US" dirty="0" smtClean="0"/>
+              <a:t>Curve generation</a:t>
+            </a:r>
+            <a:endParaRPr lang="en-US" dirty="0"/>
+          </a:p>
+        </p:txBody>
+      </p:sp>
+      <p:sp>
+        <p:nvSpPr>
+          <p:cNvPr id="4" name="Content Placeholder 3"/>
+          <p:cNvSpPr>
+            <a:spLocks noGrp="1"/>
+          </p:cNvSpPr>
+          <p:nvPr>
+            <p:ph idx="1"/>
+          </p:nvPr>
+        </p:nvSpPr>
+        <p:spPr>
+          <a:xfrm>
+            <a:off x="228601" y="1632857"/>
+            <a:ext cx="11625942" cy="5061857"/>
+          </a:xfrm>
+          <a:prstGeom prst="rect">
+            <a:avLst/>
+          </a:prstGeom>
+          <a:solidFill>
+            <a:schemeClr val="bg1"/>
+          </a:solidFill>
+          <a:ln>
+            <a:solidFill>
+              <a:srgbClr val="F7F7F7"/>
+            </a:solidFill>
+          </a:ln>
+          <a:effectLst/>
+        </p:spPr>
+        <p:style>
+          <a:lnRef idx="1">
+            <a:schemeClr val="accent1"/>
+          </a:lnRef>
+          <a:fillRef idx="3">
+            <a:schemeClr val="accent1"/>
+          </a:fillRef>
+          <a:effectRef idx="2">
+            <a:schemeClr val="accent1"/>
+          </a:effectRef>
+          <a:fontRef idx="minor">
+            <a:schemeClr val="lt1"/>
+          </a:fontRef>
+        </p:style>
+        <p:txBody>
+          <a:bodyPr rtlCol="0" anchor="ctr"/>
+          <a:lstStyle/>
+          <a:p>
+            <a:endParaRPr lang="en-US"/>
+          </a:p>
+        </p:txBody>
+      </p:sp>
+      <p:sp>
+        <p:nvSpPr>
+          <p:cNvPr id="5" name="TextBox 4"/>
+          <p:cNvSpPr txBox="1"/>
+          <p:nvPr/>
+        </p:nvSpPr>
+        <p:spPr>
+          <a:xfrm>
+            <a:off x="407606" y="1910443"/>
+            <a:ext cx="11335358" cy="954107"/>
+          </a:xfrm>
+          <a:prstGeom prst="rect">
+            <a:avLst/>
+          </a:prstGeom>
+          <a:noFill/>
+        </p:spPr>
+        <p:txBody>
+          <a:bodyPr wrap="square" rtlCol="0">
+            <a:spAutoFit/>
+          </a:bodyPr>
+          <a:lstStyle/>
+          <a:p>
+            <a:r>
+              <a:rPr lang="en-US" sz="2800" dirty="0" smtClean="0"/>
+              <a:t>So what these algorithms are actually doing is finding a good, </a:t>
+            </a:r>
+            <a:r>
+              <a:rPr lang="en-US" sz="2800" dirty="0" err="1" smtClean="0"/>
+              <a:t>squarefree</a:t>
+            </a:r>
+            <a:r>
+              <a:rPr lang="en-US" sz="2800" dirty="0" smtClean="0"/>
+              <a:t> D such that our lattice is built by </a:t>
+            </a:r>
+            <a:endParaRPr lang="en-US" sz="2800" dirty="0"/>
+          </a:p>
+        </p:txBody>
+      </p:sp>
+      <p:pic>
+        <p:nvPicPr>
+          <p:cNvPr id="6" name="Picture 5"/>
+          <p:cNvPicPr>
+            <a:picLocks noChangeAspect="1"/>
+          </p:cNvPicPr>
+          <p:nvPr>
+            <p:custDataLst>
+              <p:tags r:id="rId1"/>
+            </p:custDataLst>
+          </p:nvPr>
+        </p:nvPicPr>
+        <p:blipFill>
+          <a:blip r:embed="rId3" cstate="print">
+            <a:extLst>
+              <a:ext uri="{28A0092B-C50C-407E-A947-70E740481C1C}">
+                <a14:useLocalDpi xmlns:a14="http://schemas.microsoft.com/office/drawing/2010/main" val="0"/>
+              </a:ext>
+            </a:extLst>
+          </a:blip>
+          <a:stretch>
+            <a:fillRect/>
+          </a:stretch>
+        </p:blipFill>
+        <p:spPr>
+          <a:xfrm>
+            <a:off x="841828" y="3181843"/>
+            <a:ext cx="10560173" cy="737014"/>
+          </a:xfrm>
+          <a:prstGeom prst="rect">
+            <a:avLst/>
+          </a:prstGeom>
+        </p:spPr>
+      </p:pic>
+    </p:spTree>
+    <p:extLst>
+      <p:ext uri="{BB962C8B-B14F-4D97-AF65-F5344CB8AC3E}">
+        <p14:creationId xmlns:p14="http://schemas.microsoft.com/office/powerpoint/2010/main" val="1287094062"/>
+      </p:ext>
+    </p:extLst>
+  </p:cSld>
+  <p:clrMapOvr>
+    <a:masterClrMapping/>
+  </p:clrMapOvr>
 </p:sld>
 </file>
 
@@ -5070,7 +5853,6 @@
               <a:rPr lang="en-US" dirty="0" smtClean="0"/>
               <a:t>satisfying</a:t>
             </a:r>
-            <a:endParaRPr lang="en-US" dirty="0" smtClean="0"/>
           </a:p>
           <a:p>
             <a:pPr marL="0" indent="0">
@@ -5159,7 +5941,7 @@
   <p:timing>
     <p:tnLst>
       <p:par>
-        <p:cTn xmlns:p14="http://schemas.microsoft.com/office/powerpoint/2010/main" id="1" dur="indefinite" restart="never" nodeType="tmRoot"/>
+        <p:cTn id="1" dur="indefinite" restart="never" nodeType="tmRoot"/>
       </p:par>
     </p:tnLst>
   </p:timing>
@@ -5296,7 +6078,7 @@
   <p:timing>
     <p:tnLst>
       <p:par>
-        <p:cTn xmlns:p14="http://schemas.microsoft.com/office/powerpoint/2010/main" id="1" dur="indefinite" restart="never" nodeType="tmRoot"/>
+        <p:cTn id="1" dur="indefinite" restart="never" nodeType="tmRoot"/>
       </p:par>
     </p:tnLst>
   </p:timing>
@@ -5515,7 +6297,7 @@
   <p:timing>
     <p:tnLst>
       <p:par>
-        <p:cTn xmlns:p14="http://schemas.microsoft.com/office/powerpoint/2010/main" id="1" dur="indefinite" restart="never" nodeType="tmRoot"/>
+        <p:cTn id="1" dur="indefinite" restart="never" nodeType="tmRoot"/>
       </p:par>
     </p:tnLst>
   </p:timing>
@@ -5723,7 +6505,7 @@
   <p:timing>
     <p:tnLst>
       <p:par>
-        <p:cTn xmlns:p14="http://schemas.microsoft.com/office/powerpoint/2010/main" id="1" dur="indefinite" restart="never" nodeType="tmRoot"/>
+        <p:cTn id="1" dur="indefinite" restart="never" nodeType="tmRoot"/>
       </p:par>
     </p:tnLst>
   </p:timing>
@@ -5893,7 +6675,7 @@
           <p:nvPr/>
         </p:nvPicPr>
         <p:blipFill>
-          <a:blip r:embed="rId2">
+          <a:blip r:embed="rId2" cstate="print">
             <a:extLst>
               <a:ext uri="{28A0092B-C50C-407E-A947-70E740481C1C}">
                 <a14:useLocalDpi xmlns:a14="http://schemas.microsoft.com/office/drawing/2010/main" val="0"/>
@@ -5957,7 +6739,7 @@
   <p:timing>
     <p:tnLst>
       <p:par>
-        <p:cTn xmlns:p14="http://schemas.microsoft.com/office/powerpoint/2010/main" id="1" dur="indefinite" restart="never" nodeType="tmRoot"/>
+        <p:cTn id="1" dur="indefinite" restart="never" nodeType="tmRoot"/>
       </p:par>
     </p:tnLst>
   </p:timing>
@@ -6177,15 +6959,7 @@
             </a:pPr>
             <a:r>
               <a:rPr lang="en-US" dirty="0" smtClean="0"/>
-              <a:t>Efficient when                            </a:t>
-            </a:r>
-            <a:r>
-              <a:rPr lang="en-US" dirty="0" smtClean="0"/>
-              <a:t>, </a:t>
-            </a:r>
-            <a:r>
-              <a:rPr lang="en-US" dirty="0" smtClean="0"/>
-              <a:t>with </a:t>
+              <a:t>Efficient when                            , with </a:t>
             </a:r>
             <a:r>
               <a:rPr lang="en-US" i="1" dirty="0" smtClean="0">
@@ -6221,7 +6995,7 @@
           <p:nvPr/>
         </p:nvPicPr>
         <p:blipFill>
-          <a:blip r:embed="rId2">
+          <a:blip r:embed="rId2" cstate="print">
             <a:extLst>
               <a:ext uri="{28A0092B-C50C-407E-A947-70E740481C1C}">
                 <a14:useLocalDpi xmlns:a14="http://schemas.microsoft.com/office/drawing/2010/main" val="0"/>
@@ -6251,7 +7025,7 @@
           <p:nvPr/>
         </p:nvPicPr>
         <p:blipFill>
-          <a:blip r:embed="rId3">
+          <a:blip r:embed="rId3" cstate="print">
             <a:extLst>
               <a:ext uri="{28A0092B-C50C-407E-A947-70E740481C1C}">
                 <a14:useLocalDpi xmlns:a14="http://schemas.microsoft.com/office/drawing/2010/main" val="0"/>
@@ -6281,7 +7055,7 @@
           <p:nvPr/>
         </p:nvPicPr>
         <p:blipFill>
-          <a:blip r:embed="rId4">
+          <a:blip r:embed="rId4" cstate="print">
             <a:extLst>
               <a:ext uri="{28A0092B-C50C-407E-A947-70E740481C1C}">
                 <a14:useLocalDpi xmlns:a14="http://schemas.microsoft.com/office/drawing/2010/main" val="0"/>
@@ -6311,7 +7085,7 @@
           <p:nvPr/>
         </p:nvPicPr>
         <p:blipFill>
-          <a:blip r:embed="rId5">
+          <a:blip r:embed="rId5" cstate="print">
             <a:extLst>
               <a:ext uri="{28A0092B-C50C-407E-A947-70E740481C1C}">
                 <a14:useLocalDpi xmlns:a14="http://schemas.microsoft.com/office/drawing/2010/main" val="0"/>
@@ -6345,7 +7119,7 @@
   <p:timing>
     <p:tnLst>
       <p:par>
-        <p:cTn xmlns:p14="http://schemas.microsoft.com/office/powerpoint/2010/main" id="1" dur="indefinite" restart="never" nodeType="tmRoot"/>
+        <p:cTn id="1" dur="indefinite" restart="never" nodeType="tmRoot"/>
       </p:par>
     </p:tnLst>
   </p:timing>
@@ -6538,7 +7312,7 @@
           <p:nvPr/>
         </p:nvPicPr>
         <p:blipFill>
-          <a:blip r:embed="rId2">
+          <a:blip r:embed="rId2" cstate="print">
             <a:extLst>
               <a:ext uri="{28A0092B-C50C-407E-A947-70E740481C1C}">
                 <a14:useLocalDpi xmlns:a14="http://schemas.microsoft.com/office/drawing/2010/main" val="0"/>
@@ -6572,7 +7346,7 @@
   <p:timing>
     <p:tnLst>
       <p:par>
-        <p:cTn xmlns:p14="http://schemas.microsoft.com/office/powerpoint/2010/main" id="1" dur="indefinite" restart="never" nodeType="tmRoot"/>
+        <p:cTn id="1" dur="indefinite" restart="never" nodeType="tmRoot"/>
       </p:par>
     </p:tnLst>
   </p:timing>
@@ -6709,11 +7483,155 @@
   <p:timing>
     <p:tnLst>
       <p:par>
-        <p:cTn xmlns:p14="http://schemas.microsoft.com/office/powerpoint/2010/main" id="1" dur="indefinite" restart="never" nodeType="tmRoot"/>
+        <p:cTn id="1" dur="indefinite" restart="never" nodeType="tmRoot"/>
       </p:par>
     </p:tnLst>
   </p:timing>
 </p:sld>
+</file>
+
+<file path=ppt/tags/tag1.xml><?xml version="1.0" encoding="utf-8"?>
+<p:tagLst xmlns:a="http://schemas.openxmlformats.org/drawingml/2006/main" xmlns:r="http://schemas.openxmlformats.org/officeDocument/2006/relationships" xmlns:p="http://schemas.openxmlformats.org/presentationml/2006/main">
+  <p:tag name="ORIGINALHEIGHT" val="491.25"/>
+  <p:tag name="ORIGINALWIDTH" val="3335.25"/>
+  <p:tag name="OUTPUTDPI" val="1200"/>
+  <p:tag name="LATEXADDIN" val="\documentclass{article}&#10;\usepackage{amsmath}&#10;\usepackage{amsfonts} &#10;\pagestyle{empty}&#10;\begin{document}&#10;&#10;Define the lattice &#10;$$ L = Z\omega_{1} + Z \omega_{2}$$ Then there exists an elliptic curve that is isomorphic to $\mathbb{C}/ L$. &#10;&#10;&#10;\end{document}"/>
+  <p:tag name="IGUANATEXSIZE" val="20"/>
+  <p:tag name="IGUANATEXCURSOR" val="105"/>
+  <p:tag name="TRANSPARENCY" val="True"/>
+  <p:tag name="FILENAME" val=""/>
+  <p:tag name="INPUTTYPE" val="0"/>
+  <p:tag name="LATEXENGINEID" val="0"/>
+  <p:tag name="TEMPFOLDER" val="c:\temp\"/>
+</p:tagLst>
+</file>
+
+<file path=ppt/tags/tag2.xml><?xml version="1.0" encoding="utf-8"?>
+<p:tagLst xmlns:a="http://schemas.openxmlformats.org/drawingml/2006/main" xmlns:r="http://schemas.openxmlformats.org/officeDocument/2006/relationships" xmlns:p="http://schemas.openxmlformats.org/presentationml/2006/main">
+  <p:tag name="ORIGINALHEIGHT" val="491.25"/>
+  <p:tag name="ORIGINALWIDTH" val="3335.25"/>
+  <p:tag name="OUTPUTDPI" val="1200"/>
+  <p:tag name="LATEXADDIN" val="\documentclass{article}&#10;\usepackage{amsmath}&#10;\usepackage{amsfonts} &#10;\pagestyle{empty}&#10;\begin{document}&#10;&#10;Define the lattice &#10;$$ L = Z\omega_{1} + Z \omega_{2}$$ Then there exists an elliptic curve that is isomorphic to $\mathbb{C}/ L$. &#10;&#10;&#10;\end{document}"/>
+  <p:tag name="IGUANATEXSIZE" val="20"/>
+  <p:tag name="IGUANATEXCURSOR" val="105"/>
+  <p:tag name="TRANSPARENCY" val="True"/>
+  <p:tag name="FILENAME" val=""/>
+  <p:tag name="INPUTTYPE" val="0"/>
+  <p:tag name="LATEXENGINEID" val="0"/>
+  <p:tag name="TEMPFOLDER" val="c:\temp\"/>
+</p:tagLst>
+</file>
+
+<file path=ppt/tags/tag3.xml><?xml version="1.0" encoding="utf-8"?>
+<p:tagLst xmlns:a="http://schemas.openxmlformats.org/drawingml/2006/main" xmlns:r="http://schemas.openxmlformats.org/officeDocument/2006/relationships" xmlns:p="http://schemas.openxmlformats.org/presentationml/2006/main">
+  <p:tag name="ORIGINALHEIGHT" val="124.5"/>
+  <p:tag name="ORIGINALWIDTH" val="1459.5"/>
+  <p:tag name="OUTPUTDPI" val="1200"/>
+  <p:tag name="LATEXADDIN" val="\documentclass{article}&#10;\usepackage{amsmath}&#10;\pagestyle{empty}&#10;\begin{document}&#10;&#10;&#10;$z \rightarrow ( \wp(z), \wp' (z)), \&gt; \&gt; \&gt; \&gt; \&gt; 0 \rightarrow O $&#10;&#10;\end{document}"/>
+  <p:tag name="IGUANATEXSIZE" val="20"/>
+  <p:tag name="IGUANATEXCURSOR" val="150"/>
+  <p:tag name="TRANSPARENCY" val="True"/>
+  <p:tag name="FILENAME" val=""/>
+  <p:tag name="INPUTTYPE" val="0"/>
+  <p:tag name="LATEXENGINEID" val="0"/>
+  <p:tag name="TEMPFOLDER" val="c:\temp\"/>
+</p:tagLst>
+</file>
+
+<file path=ppt/tags/tag4.xml><?xml version="1.0" encoding="utf-8"?>
+<p:tagLst xmlns:a="http://schemas.openxmlformats.org/drawingml/2006/main" xmlns:r="http://schemas.openxmlformats.org/officeDocument/2006/relationships" xmlns:p="http://schemas.openxmlformats.org/presentationml/2006/main">
+  <p:tag name="ORIGINALHEIGHT" val="224.25"/>
+  <p:tag name="ORIGINALWIDTH" val="1812.75"/>
+  <p:tag name="OUTPUTDPI" val="1200"/>
+  <p:tag name="LATEXADDIN" val="\documentclass{article}&#10;\usepackage{amsmath}&#10;\pagestyle{empty}&#10;\begin{document}&#10;&#10;$\wp(z) = \frac{1}{z^{2}} + \sum_{\omega \in L}\left(\frac{1}{(z-\omega)^{2}} - \frac{1}{\omega^{2}}\right) $&#10;&#10;&#10;\end{document}"/>
+  <p:tag name="IGUANATEXSIZE" val="20"/>
+  <p:tag name="IGUANATEXCURSOR" val="82"/>
+  <p:tag name="TRANSPARENCY" val="True"/>
+  <p:tag name="FILENAME" val=""/>
+  <p:tag name="INPUTTYPE" val="0"/>
+  <p:tag name="LATEXENGINEID" val="0"/>
+  <p:tag name="TEMPFOLDER" val="c:\temp\"/>
+</p:tagLst>
+</file>
+
+<file path=ppt/tags/tag5.xml><?xml version="1.0" encoding="utf-8"?>
+<p:tagLst xmlns:a="http://schemas.openxmlformats.org/drawingml/2006/main" xmlns:r="http://schemas.openxmlformats.org/officeDocument/2006/relationships" xmlns:p="http://schemas.openxmlformats.org/presentationml/2006/main">
+  <p:tag name="ORIGINALHEIGHT" val="171.75"/>
+  <p:tag name="ORIGINALWIDTH" val="1308"/>
+  <p:tag name="OUTPUTDPI" val="1200"/>
+  <p:tag name="LATEXADDIN" val="\documentclass{article}&#10;\usepackage{amsmath}&#10;\pagestyle{empty}&#10;\begin{document}&#10;&#10;$\wp ' (z) = -2 \sum_{\omega \in L} \frac{1}{(z- \omega)^{2}} $&#10;&#10;&#10;\end{document}"/>
+  <p:tag name="IGUANATEXSIZE" val="20"/>
+  <p:tag name="IGUANATEXCURSOR" val="144"/>
+  <p:tag name="TRANSPARENCY" val="True"/>
+  <p:tag name="FILENAME" val=""/>
+  <p:tag name="INPUTTYPE" val="0"/>
+  <p:tag name="LATEXENGINEID" val="0"/>
+  <p:tag name="TEMPFOLDER" val="c:\temp\"/>
+</p:tagLst>
+</file>
+
+<file path=ppt/tags/tag6.xml><?xml version="1.0" encoding="utf-8"?>
+<p:tagLst xmlns:a="http://schemas.openxmlformats.org/drawingml/2006/main" xmlns:r="http://schemas.openxmlformats.org/officeDocument/2006/relationships" xmlns:p="http://schemas.openxmlformats.org/presentationml/2006/main">
+  <p:tag name="ORIGINALHEIGHT" val="124.5"/>
+  <p:tag name="ORIGINALWIDTH" val="3126"/>
+  <p:tag name="OUTPUTDPI" val="1200"/>
+  <p:tag name="LATEXADDIN" val="\documentclass{article}&#10;\usepackage{amsmath}&#10;\pagestyle{empty}&#10;\begin{document}&#10;&#10;$(\wp(z_{1}), \wp'(z_{1})) \oplus (\wp(z_{2}), \wp'(z_{2})) = (\wp(z_{1} + z_{2}), \wp'(z_{1} + z_{2})) $&#10;&#10;&#10;\end{document}"/>
+  <p:tag name="IGUANATEXSIZE" val="20"/>
+  <p:tag name="IGUANATEXCURSOR" val="82"/>
+  <p:tag name="TRANSPARENCY" val="True"/>
+  <p:tag name="FILENAME" val=""/>
+  <p:tag name="INPUTTYPE" val="0"/>
+  <p:tag name="LATEXENGINEID" val="0"/>
+  <p:tag name="TEMPFOLDER" val="c:\temp\"/>
+</p:tagLst>
+</file>
+
+<file path=ppt/tags/tag7.xml><?xml version="1.0" encoding="utf-8"?>
+<p:tagLst xmlns:a="http://schemas.openxmlformats.org/drawingml/2006/main" xmlns:r="http://schemas.openxmlformats.org/officeDocument/2006/relationships" xmlns:p="http://schemas.openxmlformats.org/presentationml/2006/main">
+  <p:tag name="ORIGINALHEIGHT" val="124.5"/>
+  <p:tag name="ORIGINALWIDTH" val="3126"/>
+  <p:tag name="OUTPUTDPI" val="1200"/>
+  <p:tag name="LATEXADDIN" val="\documentclass{article}&#10;\usepackage{amsmath}&#10;\pagestyle{empty}&#10;\begin{document}&#10;&#10;$(\wp(z_{1}), \wp'(z_{1})) \oplus (\wp(z_{2}), \wp'(z_{2})) = (\wp(z_{1} + z_{2}), \wp'(z_{1} + z_{2})) $&#10;&#10;&#10;\end{document}"/>
+  <p:tag name="IGUANATEXSIZE" val="20"/>
+  <p:tag name="IGUANATEXCURSOR" val="82"/>
+  <p:tag name="TRANSPARENCY" val="True"/>
+  <p:tag name="FILENAME" val=""/>
+  <p:tag name="INPUTTYPE" val="0"/>
+  <p:tag name="LATEXENGINEID" val="0"/>
+  <p:tag name="TEMPFOLDER" val="c:\temp\"/>
+</p:tagLst>
+</file>
+
+<file path=ppt/tags/tag8.xml><?xml version="1.0" encoding="utf-8"?>
+<p:tagLst xmlns:a="http://schemas.openxmlformats.org/drawingml/2006/main" xmlns:r="http://schemas.openxmlformats.org/officeDocument/2006/relationships" xmlns:p="http://schemas.openxmlformats.org/presentationml/2006/main">
+  <p:tag name="ORIGINALHEIGHT" val="124.5"/>
+  <p:tag name="ORIGINALWIDTH" val="2398.5"/>
+  <p:tag name="OUTPUTDPI" val="1200"/>
+  <p:tag name="LATEXADDIN" val="\documentclass{article}&#10;\usepackage{amsmath}&#10;\pagestyle{empty}&#10;\begin{document}&#10;&#10;&#10;$mz \rightarrow(\wp(mz), \wp'(mz)): m(x,y) \rightarrow [m](x,y)$ &#10;&#10;\end{document}"/>
+  <p:tag name="IGUANATEXSIZE" val="20"/>
+  <p:tag name="IGUANATEXCURSOR" val="147"/>
+  <p:tag name="TRANSPARENCY" val="True"/>
+  <p:tag name="FILENAME" val=""/>
+  <p:tag name="INPUTTYPE" val="0"/>
+  <p:tag name="LATEXENGINEID" val="0"/>
+  <p:tag name="TEMPFOLDER" val="c:\temp\"/>
+</p:tagLst>
+</file>
+
+<file path=ppt/tags/tag9.xml><?xml version="1.0" encoding="utf-8"?>
+<p:tagLst xmlns:a="http://schemas.openxmlformats.org/drawingml/2006/main" xmlns:r="http://schemas.openxmlformats.org/officeDocument/2006/relationships" xmlns:p="http://schemas.openxmlformats.org/presentationml/2006/main">
+  <p:tag name="ORIGINALHEIGHT" val="299.25"/>
+  <p:tag name="ORIGINALWIDTH" val="4287.75"/>
+  <p:tag name="OUTPUTDPI" val="1200"/>
+  <p:tag name="LATEXADDIN" val="\documentclass{article}&#10;\usepackage{amsmath}&#10;\pagestyle{empty}&#10;\begin{document}&#10;&#10;$Z[\frac{1 + \sqrt{-D}}{2}]$ if $D \equiv 3 \mod 4$  or $Z[\sqrt{-D}]$ if $D \equiv 1,2 \mod 4$ where $D$ is squarefree.&#10;&#10;&#10;\end{document}"/>
+  <p:tag name="IGUANATEXSIZE" val="20"/>
+  <p:tag name="IGUANATEXCURSOR" val="201"/>
+  <p:tag name="TRANSPARENCY" val="True"/>
+  <p:tag name="FILENAME" val=""/>
+  <p:tag name="INPUTTYPE" val="0"/>
+  <p:tag name="LATEXENGINEID" val="0"/>
+  <p:tag name="TEMPFOLDER" val="c:\temp\"/>
+</p:tagLst>
 </file>
 
 <file path=ppt/theme/theme1.xml><?xml version="1.0" encoding="utf-8"?>

</xml_diff>

<commit_message>
added in presentation ,wirteup, explaining why t^2 - 4p = D
</commit_message>
<xml_diff>
--- a/Presentation.ppt.pptx
+++ b/Presentation.ppt.pptx
@@ -119,7 +119,7 @@
   </p:defaultTextStyle>
   <p:extLst>
     <p:ext uri="{EFAFB233-063F-42B5-8137-9DF3F51BA10A}">
-      <p15:sldGuideLst xmlns:p15="http://schemas.microsoft.com/office/powerpoint/2012/main" xmlns="">
+      <p15:sldGuideLst xmlns:p15="http://schemas.microsoft.com/office/powerpoint/2012/main">
         <p15:guide id="1" orient="horz" pos="2160">
           <p15:clr>
             <a:srgbClr val="A4A3A4"/>
@@ -261,7 +261,7 @@
           <a:p>
             <a:fld id="{0A2C9084-70B7-4828-AD77-7D77F1A8B45B}" type="datetimeFigureOut">
               <a:rPr lang="en-US" smtClean="0"/>
-              <a:t>12/2/15</a:t>
+              <a:t>12/2/2015</a:t>
             </a:fld>
             <a:endParaRPr lang="en-US"/>
           </a:p>
@@ -894,7 +894,7 @@
           <a:p>
             <a:fld id="{0A2C9084-70B7-4828-AD77-7D77F1A8B45B}" type="datetimeFigureOut">
               <a:rPr lang="en-US" smtClean="0"/>
-              <a:t>12/2/15</a:t>
+              <a:t>12/2/2015</a:t>
             </a:fld>
             <a:endParaRPr lang="en-US"/>
           </a:p>
@@ -1171,7 +1171,7 @@
           <a:p>
             <a:fld id="{0A2C9084-70B7-4828-AD77-7D77F1A8B45B}" type="datetimeFigureOut">
               <a:rPr lang="en-US" smtClean="0"/>
-              <a:t>12/2/15</a:t>
+              <a:t>12/2/2015</a:t>
             </a:fld>
             <a:endParaRPr lang="en-US"/>
           </a:p>
@@ -1336,7 +1336,7 @@
           <a:p>
             <a:fld id="{0A2C9084-70B7-4828-AD77-7D77F1A8B45B}" type="datetimeFigureOut">
               <a:rPr lang="en-US" smtClean="0"/>
-              <a:t>12/2/15</a:t>
+              <a:t>12/2/2015</a:t>
             </a:fld>
             <a:endParaRPr lang="en-US"/>
           </a:p>
@@ -1517,7 +1517,7 @@
           <a:p>
             <a:fld id="{0A2C9084-70B7-4828-AD77-7D77F1A8B45B}" type="datetimeFigureOut">
               <a:rPr lang="en-US" smtClean="0"/>
-              <a:t>12/2/15</a:t>
+              <a:t>12/2/2015</a:t>
             </a:fld>
             <a:endParaRPr lang="en-US"/>
           </a:p>
@@ -2162,7 +2162,7 @@
           <a:p>
             <a:fld id="{0A2C9084-70B7-4828-AD77-7D77F1A8B45B}" type="datetimeFigureOut">
               <a:rPr lang="en-US" smtClean="0"/>
-              <a:t>12/2/15</a:t>
+              <a:t>12/2/2015</a:t>
             </a:fld>
             <a:endParaRPr lang="en-US"/>
           </a:p>
@@ -2588,7 +2588,7 @@
           <a:p>
             <a:fld id="{0A2C9084-70B7-4828-AD77-7D77F1A8B45B}" type="datetimeFigureOut">
               <a:rPr lang="en-US" smtClean="0"/>
-              <a:t>12/2/15</a:t>
+              <a:t>12/2/2015</a:t>
             </a:fld>
             <a:endParaRPr lang="en-US"/>
           </a:p>
@@ -2701,7 +2701,7 @@
           <a:p>
             <a:fld id="{0A2C9084-70B7-4828-AD77-7D77F1A8B45B}" type="datetimeFigureOut">
               <a:rPr lang="en-US" smtClean="0"/>
-              <a:t>12/2/15</a:t>
+              <a:t>12/2/2015</a:t>
             </a:fld>
             <a:endParaRPr lang="en-US"/>
           </a:p>
@@ -2882,7 +2882,7 @@
           <a:p>
             <a:fld id="{0A2C9084-70B7-4828-AD77-7D77F1A8B45B}" type="datetimeFigureOut">
               <a:rPr lang="en-US" smtClean="0"/>
-              <a:t>12/2/15</a:t>
+              <a:t>12/2/2015</a:t>
             </a:fld>
             <a:endParaRPr lang="en-US"/>
           </a:p>
@@ -3148,7 +3148,7 @@
           <a:p>
             <a:fld id="{0A2C9084-70B7-4828-AD77-7D77F1A8B45B}" type="datetimeFigureOut">
               <a:rPr lang="en-US" smtClean="0"/>
-              <a:t>12/2/15</a:t>
+              <a:t>12/2/2015</a:t>
             </a:fld>
             <a:endParaRPr lang="en-US"/>
           </a:p>
@@ -3618,7 +3618,7 @@
           <a:p>
             <a:fld id="{0A2C9084-70B7-4828-AD77-7D77F1A8B45B}" type="datetimeFigureOut">
               <a:rPr lang="en-US" smtClean="0"/>
-              <a:t>12/2/15</a:t>
+              <a:t>12/2/2015</a:t>
             </a:fld>
             <a:endParaRPr lang="en-US"/>
           </a:p>
@@ -4178,7 +4178,7 @@
           <a:p>
             <a:fld id="{0A2C9084-70B7-4828-AD77-7D77F1A8B45B}" type="datetimeFigureOut">
               <a:rPr lang="en-US" smtClean="0"/>
-              <a:t>12/2/15</a:t>
+              <a:t>12/2/2015</a:t>
             </a:fld>
             <a:endParaRPr lang="en-US"/>
           </a:p>
@@ -4835,7 +4835,7 @@
   <p:timing>
     <p:tnLst>
       <p:par>
-        <p:cTn xmlns:p14="http://schemas.microsoft.com/office/powerpoint/2010/main" id="1" dur="indefinite" restart="never" nodeType="tmRoot"/>
+        <p:cTn id="1" dur="indefinite" restart="never" nodeType="tmRoot"/>
       </p:par>
     </p:tnLst>
   </p:timing>
@@ -4949,8 +4949,21 @@
             </a:pPr>
             <a:r>
               <a:rPr lang="en-US" dirty="0" smtClean="0"/>
-              <a:t>Key result:</a:t>
-            </a:r>
+              <a:t>Key result</a:t>
+            </a:r>
+            <a:r>
+              <a:rPr lang="en-US" dirty="0" smtClean="0"/>
+              <a:t>: All </a:t>
+            </a:r>
+            <a:r>
+              <a:rPr lang="en-US" dirty="0" err="1" smtClean="0"/>
+              <a:t>endomorphisms</a:t>
+            </a:r>
+            <a:r>
+              <a:rPr lang="en-US" dirty="0" smtClean="0"/>
+              <a:t> of elliptic curves are just multiplying points by a constant, i.e. 		Our lattice still remains the same, so</a:t>
+            </a:r>
+            <a:endParaRPr lang="en-US" dirty="0" smtClean="0"/>
           </a:p>
           <a:p>
             <a:pPr marL="114300" indent="0">
@@ -4994,8 +5007,13 @@
             </a:pPr>
             <a:r>
               <a:rPr lang="en-US" dirty="0" smtClean="0"/>
-              <a:t>This ring has discriminant           or              , called the CM discriminant </a:t>
-            </a:r>
+              <a:t>This ring has discriminant           or              , called the CM </a:t>
+            </a:r>
+            <a:r>
+              <a:rPr lang="en-US" dirty="0" smtClean="0"/>
+              <a:t>discriminant; this ring can be treated as a lattice on its own. </a:t>
+            </a:r>
+            <a:endParaRPr lang="en-US" dirty="0" smtClean="0"/>
           </a:p>
           <a:p>
             <a:pPr marL="114300" indent="0">
@@ -5038,7 +5056,7 @@
           <p:nvPr/>
         </p:nvPicPr>
         <p:blipFill>
-          <a:blip r:embed="rId2">
+          <a:blip r:embed="rId3" cstate="print">
             <a:extLst>
               <a:ext uri="{28A0092B-C50C-407E-A947-70E740481C1C}">
                 <a14:useLocalDpi xmlns:a14="http://schemas.microsoft.com/office/drawing/2010/main" val="0"/>
@@ -5051,7 +5069,7 @@
         </p:blipFill>
         <p:spPr>
           <a:xfrm>
-            <a:off x="5570253" y="3697468"/>
+            <a:off x="5760697" y="4028456"/>
             <a:ext cx="3427968" cy="762556"/>
           </a:xfrm>
           <a:prstGeom prst="rect">
@@ -5068,7 +5086,7 @@
           <p:nvPr/>
         </p:nvPicPr>
         <p:blipFill>
-          <a:blip r:embed="rId3">
+          <a:blip r:embed="rId4" cstate="print">
             <a:extLst>
               <a:ext uri="{28A0092B-C50C-407E-A947-70E740481C1C}">
                 <a14:useLocalDpi xmlns:a14="http://schemas.microsoft.com/office/drawing/2010/main" val="0"/>
@@ -5081,7 +5099,7 @@
         </p:blipFill>
         <p:spPr>
           <a:xfrm>
-            <a:off x="1912275" y="3923346"/>
+            <a:off x="1579523" y="4316483"/>
             <a:ext cx="2763825" cy="402396"/>
           </a:xfrm>
           <a:prstGeom prst="rect">
@@ -5098,7 +5116,7 @@
           <p:nvPr/>
         </p:nvPicPr>
         <p:blipFill>
-          <a:blip r:embed="rId4">
+          <a:blip r:embed="rId5" cstate="print">
             <a:extLst>
               <a:ext uri="{28A0092B-C50C-407E-A947-70E740481C1C}">
                 <a14:useLocalDpi xmlns:a14="http://schemas.microsoft.com/office/drawing/2010/main" val="0"/>
@@ -5111,7 +5129,7 @@
         </p:blipFill>
         <p:spPr>
           <a:xfrm>
-            <a:off x="1938989" y="2477243"/>
+            <a:off x="1306069" y="2808537"/>
             <a:ext cx="3976235" cy="339520"/>
           </a:xfrm>
           <a:prstGeom prst="rect">
@@ -5128,7 +5146,7 @@
           <p:nvPr/>
         </p:nvPicPr>
         <p:blipFill>
-          <a:blip r:embed="rId5">
+          <a:blip r:embed="rId6" cstate="print">
             <a:extLst>
               <a:ext uri="{28A0092B-C50C-407E-A947-70E740481C1C}">
                 <a14:useLocalDpi xmlns:a14="http://schemas.microsoft.com/office/drawing/2010/main" val="0"/>
@@ -5141,7 +5159,7 @@
         </p:blipFill>
         <p:spPr>
           <a:xfrm>
-            <a:off x="4558624" y="4816161"/>
+            <a:off x="4499946" y="5150219"/>
             <a:ext cx="601305" cy="364954"/>
           </a:xfrm>
           <a:prstGeom prst="rect">
@@ -5158,7 +5176,7 @@
           <p:nvPr/>
         </p:nvPicPr>
         <p:blipFill>
-          <a:blip r:embed="rId6">
+          <a:blip r:embed="rId7" cstate="print">
             <a:extLst>
               <a:ext uri="{28A0092B-C50C-407E-A947-70E740481C1C}">
                 <a14:useLocalDpi xmlns:a14="http://schemas.microsoft.com/office/drawing/2010/main" val="0"/>
@@ -5171,8 +5189,42 @@
         </p:blipFill>
         <p:spPr>
           <a:xfrm>
-            <a:off x="5760697" y="4791012"/>
+            <a:off x="5760697" y="5125069"/>
             <a:ext cx="937287" cy="415254"/>
+          </a:xfrm>
+          <a:prstGeom prst="rect">
+            <a:avLst/>
+          </a:prstGeom>
+        </p:spPr>
+      </p:pic>
+      <p:pic>
+        <p:nvPicPr>
+          <p:cNvPr id="4" name="Picture 3"/>
+          <p:cNvPicPr>
+            <a:picLocks noChangeAspect="1"/>
+          </p:cNvPicPr>
+          <p:nvPr>
+            <p:custDataLst>
+              <p:tags r:id="rId1"/>
+            </p:custDataLst>
+          </p:nvPr>
+        </p:nvPicPr>
+        <p:blipFill>
+          <a:blip r:embed="rId8" cstate="print">
+            <a:extLst>
+              <a:ext uri="{28A0092B-C50C-407E-A947-70E740481C1C}">
+                <a14:useLocalDpi xmlns:a14="http://schemas.microsoft.com/office/drawing/2010/main" val="0"/>
+              </a:ext>
+            </a:extLst>
+          </a:blip>
+          <a:stretch>
+            <a:fillRect/>
+          </a:stretch>
+        </p:blipFill>
+        <p:spPr>
+          <a:xfrm>
+            <a:off x="3746652" y="2199987"/>
+            <a:ext cx="1053947" cy="303749"/>
           </a:xfrm>
           <a:prstGeom prst="rect">
             <a:avLst/>
@@ -5192,7 +5244,7 @@
   <p:timing>
     <p:tnLst>
       <p:par>
-        <p:cTn xmlns:p14="http://schemas.microsoft.com/office/powerpoint/2010/main" id="1" dur="indefinite" restart="never" nodeType="tmRoot"/>
+        <p:cTn id="1" dur="indefinite" restart="never" nodeType="tmRoot"/>
       </p:par>
     </p:tnLst>
   </p:timing>
@@ -5303,7 +5355,9 @@
           </a:xfrm>
         </p:spPr>
         <p:txBody>
-          <a:bodyPr/>
+          <a:bodyPr>
+            <a:normAutofit lnSpcReduction="10000"/>
+          </a:bodyPr>
           <a:lstStyle/>
           <a:p>
             <a:pPr marL="114300" indent="0">
@@ -5356,6 +5410,16 @@
             <a:pPr marL="114300" indent="0">
               <a:buNone/>
             </a:pPr>
+            <a:r>
+              <a:rPr lang="en-US" dirty="0" smtClean="0"/>
+              <a:t>After a change of basis, all 	will satisfy the quadratic </a:t>
+            </a:r>
+            <a:endParaRPr lang="en-US" dirty="0" smtClean="0"/>
+          </a:p>
+          <a:p>
+            <a:pPr marL="114300" indent="0">
+              <a:buNone/>
+            </a:pPr>
             <a:endParaRPr lang="en-US" dirty="0"/>
           </a:p>
           <a:p>
@@ -5364,8 +5428,13 @@
             </a:pPr>
             <a:r>
               <a:rPr lang="en-US" dirty="0" smtClean="0"/>
-              <a:t>All curves over        have complex multiplication </a:t>
-            </a:r>
+              <a:t>All curves over        have complex </a:t>
+            </a:r>
+            <a:r>
+              <a:rPr lang="en-US" dirty="0" smtClean="0"/>
+              <a:t>multiplication </a:t>
+            </a:r>
+            <a:endParaRPr lang="en-US" dirty="0" smtClean="0"/>
           </a:p>
           <a:p>
             <a:pPr marL="114300" indent="0">
@@ -5373,8 +5442,13 @@
             </a:pPr>
             <a:r>
               <a:rPr lang="en-US" dirty="0" smtClean="0"/>
-              <a:t>From this, we get the CM equation: </a:t>
-            </a:r>
+              <a:t>From this, we get the CM </a:t>
+            </a:r>
+            <a:r>
+              <a:rPr lang="en-US" dirty="0" smtClean="0"/>
+              <a:t>equation, or essentially the “discriminant”</a:t>
+            </a:r>
+            <a:endParaRPr lang="en-US" dirty="0" smtClean="0"/>
           </a:p>
           <a:p>
             <a:pPr marL="114300" indent="0">
@@ -5402,7 +5476,7 @@
           <p:nvPr/>
         </p:nvPicPr>
         <p:blipFill>
-          <a:blip r:embed="rId2">
+          <a:blip r:embed="rId4" cstate="print">
             <a:extLst>
               <a:ext uri="{28A0092B-C50C-407E-A947-70E740481C1C}">
                 <a14:useLocalDpi xmlns:a14="http://schemas.microsoft.com/office/drawing/2010/main" val="0"/>
@@ -5432,7 +5506,7 @@
           <p:nvPr/>
         </p:nvPicPr>
         <p:blipFill>
-          <a:blip r:embed="rId3">
+          <a:blip r:embed="rId5" cstate="print">
             <a:extLst>
               <a:ext uri="{28A0092B-C50C-407E-A947-70E740481C1C}">
                 <a14:useLocalDpi xmlns:a14="http://schemas.microsoft.com/office/drawing/2010/main" val="0"/>
@@ -5462,7 +5536,7 @@
           <p:nvPr/>
         </p:nvPicPr>
         <p:blipFill>
-          <a:blip r:embed="rId4">
+          <a:blip r:embed="rId6" cstate="print">
             <a:extLst>
               <a:ext uri="{28A0092B-C50C-407E-A947-70E740481C1C}">
                 <a14:useLocalDpi xmlns:a14="http://schemas.microsoft.com/office/drawing/2010/main" val="0"/>
@@ -5475,7 +5549,7 @@
         </p:blipFill>
         <p:spPr>
           <a:xfrm>
-            <a:off x="6651610" y="3561350"/>
+            <a:off x="6667096" y="3379910"/>
             <a:ext cx="2386829" cy="349204"/>
           </a:xfrm>
           <a:prstGeom prst="rect">
@@ -5492,7 +5566,7 @@
           <p:nvPr/>
         </p:nvPicPr>
         <p:blipFill>
-          <a:blip r:embed="rId5">
+          <a:blip r:embed="rId7" cstate="print">
             <a:extLst>
               <a:ext uri="{28A0092B-C50C-407E-A947-70E740481C1C}">
                 <a14:useLocalDpi xmlns:a14="http://schemas.microsoft.com/office/drawing/2010/main" val="0"/>
@@ -5522,7 +5596,7 @@
           <p:nvPr/>
         </p:nvPicPr>
         <p:blipFill>
-          <a:blip r:embed="rId6">
+          <a:blip r:embed="rId8" cstate="print">
             <a:extLst>
               <a:ext uri="{28A0092B-C50C-407E-A947-70E740481C1C}">
                 <a14:useLocalDpi xmlns:a14="http://schemas.microsoft.com/office/drawing/2010/main" val="0"/>
@@ -5552,7 +5626,7 @@
           <p:nvPr/>
         </p:nvPicPr>
         <p:blipFill>
-          <a:blip r:embed="rId7">
+          <a:blip r:embed="rId9" cstate="print">
             <a:extLst>
               <a:ext uri="{28A0092B-C50C-407E-A947-70E740481C1C}">
                 <a14:useLocalDpi xmlns:a14="http://schemas.microsoft.com/office/drawing/2010/main" val="0"/>
@@ -5565,8 +5639,76 @@
         </p:blipFill>
         <p:spPr>
           <a:xfrm>
-            <a:off x="3084909" y="4451491"/>
+            <a:off x="3130280" y="4590946"/>
             <a:ext cx="404122" cy="395703"/>
+          </a:xfrm>
+          <a:prstGeom prst="rect">
+            <a:avLst/>
+          </a:prstGeom>
+        </p:spPr>
+      </p:pic>
+      <p:pic>
+        <p:nvPicPr>
+          <p:cNvPr id="4" name="Picture 3"/>
+          <p:cNvPicPr>
+            <a:picLocks noChangeAspect="1"/>
+          </p:cNvPicPr>
+          <p:nvPr>
+            <p:custDataLst>
+              <p:tags r:id="rId1"/>
+            </p:custDataLst>
+          </p:nvPr>
+        </p:nvPicPr>
+        <p:blipFill>
+          <a:blip r:embed="rId10" cstate="print">
+            <a:extLst>
+              <a:ext uri="{28A0092B-C50C-407E-A947-70E740481C1C}">
+                <a14:useLocalDpi xmlns:a14="http://schemas.microsoft.com/office/drawing/2010/main" val="0"/>
+              </a:ext>
+            </a:extLst>
+          </a:blip>
+          <a:stretch>
+            <a:fillRect/>
+          </a:stretch>
+        </p:blipFill>
+        <p:spPr>
+          <a:xfrm>
+            <a:off x="4898188" y="3801603"/>
+            <a:ext cx="179137" cy="290124"/>
+          </a:xfrm>
+          <a:prstGeom prst="rect">
+            <a:avLst/>
+          </a:prstGeom>
+        </p:spPr>
+      </p:pic>
+      <p:pic>
+        <p:nvPicPr>
+          <p:cNvPr id="11" name="Picture 10"/>
+          <p:cNvPicPr>
+            <a:picLocks noChangeAspect="1"/>
+          </p:cNvPicPr>
+          <p:nvPr>
+            <p:custDataLst>
+              <p:tags r:id="rId2"/>
+            </p:custDataLst>
+          </p:nvPr>
+        </p:nvPicPr>
+        <p:blipFill>
+          <a:blip r:embed="rId11" cstate="print">
+            <a:extLst>
+              <a:ext uri="{28A0092B-C50C-407E-A947-70E740481C1C}">
+                <a14:useLocalDpi xmlns:a14="http://schemas.microsoft.com/office/drawing/2010/main" val="0"/>
+              </a:ext>
+            </a:extLst>
+          </a:blip>
+          <a:stretch>
+            <a:fillRect/>
+          </a:stretch>
+        </p:blipFill>
+        <p:spPr>
+          <a:xfrm>
+            <a:off x="9053925" y="3831123"/>
+            <a:ext cx="1688592" cy="260604"/>
           </a:xfrm>
           <a:prstGeom prst="rect">
             <a:avLst/>
@@ -5586,7 +5728,7 @@
   <p:timing>
     <p:tnLst>
       <p:par>
-        <p:cTn xmlns:p14="http://schemas.microsoft.com/office/powerpoint/2010/main" id="1" dur="indefinite" restart="never" nodeType="tmRoot"/>
+        <p:cTn id="1" dur="indefinite" restart="never" nodeType="tmRoot"/>
       </p:par>
     </p:tnLst>
   </p:timing>
@@ -5803,7 +5945,7 @@
           <p:nvPr/>
         </p:nvPicPr>
         <p:blipFill>
-          <a:blip r:embed="rId2">
+          <a:blip r:embed="rId2" cstate="print">
             <a:extLst>
               <a:ext uri="{28A0092B-C50C-407E-A947-70E740481C1C}">
                 <a14:useLocalDpi xmlns:a14="http://schemas.microsoft.com/office/drawing/2010/main" val="0"/>
@@ -5833,7 +5975,7 @@
           <p:nvPr/>
         </p:nvPicPr>
         <p:blipFill>
-          <a:blip r:embed="rId3">
+          <a:blip r:embed="rId3" cstate="print">
             <a:extLst>
               <a:ext uri="{28A0092B-C50C-407E-A947-70E740481C1C}">
                 <a14:useLocalDpi xmlns:a14="http://schemas.microsoft.com/office/drawing/2010/main" val="0"/>
@@ -5863,7 +6005,7 @@
           <p:nvPr/>
         </p:nvPicPr>
         <p:blipFill>
-          <a:blip r:embed="rId4">
+          <a:blip r:embed="rId4" cstate="print">
             <a:extLst>
               <a:ext uri="{28A0092B-C50C-407E-A947-70E740481C1C}">
                 <a14:useLocalDpi xmlns:a14="http://schemas.microsoft.com/office/drawing/2010/main" val="0"/>
@@ -5893,7 +6035,7 @@
           <p:nvPr/>
         </p:nvPicPr>
         <p:blipFill>
-          <a:blip r:embed="rId3">
+          <a:blip r:embed="rId3" cstate="print">
             <a:extLst>
               <a:ext uri="{28A0092B-C50C-407E-A947-70E740481C1C}">
                 <a14:useLocalDpi xmlns:a14="http://schemas.microsoft.com/office/drawing/2010/main" val="0"/>
@@ -5923,7 +6065,7 @@
           <p:nvPr/>
         </p:nvPicPr>
         <p:blipFill>
-          <a:blip r:embed="rId5">
+          <a:blip r:embed="rId5" cstate="print">
             <a:extLst>
               <a:ext uri="{28A0092B-C50C-407E-A947-70E740481C1C}">
                 <a14:useLocalDpi xmlns:a14="http://schemas.microsoft.com/office/drawing/2010/main" val="0"/>
@@ -5953,7 +6095,7 @@
           <p:nvPr/>
         </p:nvPicPr>
         <p:blipFill>
-          <a:blip r:embed="rId3">
+          <a:blip r:embed="rId3" cstate="print">
             <a:extLst>
               <a:ext uri="{28A0092B-C50C-407E-A947-70E740481C1C}">
                 <a14:useLocalDpi xmlns:a14="http://schemas.microsoft.com/office/drawing/2010/main" val="0"/>
@@ -5987,7 +6129,7 @@
   <p:timing>
     <p:tnLst>
       <p:par>
-        <p:cTn xmlns:p14="http://schemas.microsoft.com/office/powerpoint/2010/main" id="1" dur="indefinite" restart="never" nodeType="tmRoot"/>
+        <p:cTn id="1" dur="indefinite" restart="never" nodeType="tmRoot"/>
       </p:par>
     </p:tnLst>
   </p:timing>
@@ -6117,11 +6259,7 @@
             </a:pPr>
             <a:r>
               <a:rPr lang="en-US" dirty="0" smtClean="0"/>
-              <a:t>Input</a:t>
-            </a:r>
-            <a:r>
-              <a:rPr lang="en-US" dirty="0" smtClean="0"/>
-              <a:t>: </a:t>
+              <a:t>Input: </a:t>
             </a:r>
             <a:r>
               <a:rPr lang="en-US" dirty="0" err="1" smtClean="0"/>
@@ -6142,11 +6280,7 @@
             </a:r>
             <a:r>
               <a:rPr lang="en-US" dirty="0" err="1" smtClean="0"/>
-              <a:t>p,</a:t>
-            </a:r>
-            <a:r>
-              <a:rPr lang="en-US" dirty="0" err="1" smtClean="0"/>
-              <a:t>t</a:t>
+              <a:t>p,t</a:t>
             </a:r>
             <a:endParaRPr lang="en-US" dirty="0" smtClean="0"/>
           </a:p>
@@ -6248,7 +6382,7 @@
   <p:timing>
     <p:tnLst>
       <p:par>
-        <p:cTn xmlns:p14="http://schemas.microsoft.com/office/powerpoint/2010/main" id="1" dur="indefinite" restart="never" nodeType="tmRoot"/>
+        <p:cTn id="1" dur="indefinite" restart="never" nodeType="tmRoot"/>
       </p:par>
     </p:tnLst>
   </p:timing>
@@ -6472,7 +6606,7 @@
           <p:nvPr/>
         </p:nvPicPr>
         <p:blipFill>
-          <a:blip r:embed="rId2">
+          <a:blip r:embed="rId2" cstate="print">
             <a:extLst>
               <a:ext uri="{28A0092B-C50C-407E-A947-70E740481C1C}">
                 <a14:useLocalDpi xmlns:a14="http://schemas.microsoft.com/office/drawing/2010/main" val="0"/>
@@ -6502,7 +6636,7 @@
           <p:nvPr/>
         </p:nvPicPr>
         <p:blipFill>
-          <a:blip r:embed="rId3">
+          <a:blip r:embed="rId3" cstate="print">
             <a:extLst>
               <a:ext uri="{28A0092B-C50C-407E-A947-70E740481C1C}">
                 <a14:useLocalDpi xmlns:a14="http://schemas.microsoft.com/office/drawing/2010/main" val="0"/>
@@ -6532,7 +6666,7 @@
           <p:nvPr/>
         </p:nvPicPr>
         <p:blipFill>
-          <a:blip r:embed="rId4">
+          <a:blip r:embed="rId4" cstate="print">
             <a:extLst>
               <a:ext uri="{28A0092B-C50C-407E-A947-70E740481C1C}">
                 <a14:useLocalDpi xmlns:a14="http://schemas.microsoft.com/office/drawing/2010/main" val="0"/>
@@ -6562,7 +6696,7 @@
           <p:nvPr/>
         </p:nvPicPr>
         <p:blipFill>
-          <a:blip r:embed="rId5">
+          <a:blip r:embed="rId5" cstate="print">
             <a:extLst>
               <a:ext uri="{28A0092B-C50C-407E-A947-70E740481C1C}">
                 <a14:useLocalDpi xmlns:a14="http://schemas.microsoft.com/office/drawing/2010/main" val="0"/>
@@ -6592,7 +6726,7 @@
           <p:nvPr/>
         </p:nvPicPr>
         <p:blipFill>
-          <a:blip r:embed="rId6">
+          <a:blip r:embed="rId6" cstate="print">
             <a:extLst>
               <a:ext uri="{28A0092B-C50C-407E-A947-70E740481C1C}">
                 <a14:useLocalDpi xmlns:a14="http://schemas.microsoft.com/office/drawing/2010/main" val="0"/>
@@ -6622,7 +6756,7 @@
           <p:nvPr/>
         </p:nvPicPr>
         <p:blipFill>
-          <a:blip r:embed="rId7">
+          <a:blip r:embed="rId7" cstate="print">
             <a:extLst>
               <a:ext uri="{28A0092B-C50C-407E-A947-70E740481C1C}">
                 <a14:useLocalDpi xmlns:a14="http://schemas.microsoft.com/office/drawing/2010/main" val="0"/>
@@ -6656,7 +6790,7 @@
   <p:timing>
     <p:tnLst>
       <p:par>
-        <p:cTn xmlns:p14="http://schemas.microsoft.com/office/powerpoint/2010/main" id="1" dur="indefinite" restart="never" nodeType="tmRoot"/>
+        <p:cTn id="1" dur="indefinite" restart="never" nodeType="tmRoot"/>
       </p:par>
     </p:tnLst>
   </p:timing>
@@ -6823,7 +6957,6 @@
               <a:rPr lang="en-US" dirty="0" smtClean="0"/>
               <a:t> formulas, this is equivalent to E having nonzero discriminant.</a:t>
             </a:r>
-            <a:endParaRPr lang="en-US" dirty="0" smtClean="0"/>
           </a:p>
           <a:p>
             <a:pPr marL="0" indent="0">
@@ -6908,7 +7041,7 @@
           <p:nvPr/>
         </p:nvPicPr>
         <p:blipFill>
-          <a:blip r:embed="rId4">
+          <a:blip r:embed="rId4" cstate="print">
             <a:extLst>
               <a:ext uri="{28A0092B-C50C-407E-A947-70E740481C1C}">
                 <a14:useLocalDpi xmlns:a14="http://schemas.microsoft.com/office/drawing/2010/main" val="0"/>
@@ -6938,7 +7071,7 @@
           <p:nvPr/>
         </p:nvPicPr>
         <p:blipFill>
-          <a:blip r:embed="rId5">
+          <a:blip r:embed="rId5" cstate="print">
             <a:extLst>
               <a:ext uri="{28A0092B-C50C-407E-A947-70E740481C1C}">
                 <a14:useLocalDpi xmlns:a14="http://schemas.microsoft.com/office/drawing/2010/main" val="0"/>
@@ -6972,7 +7105,7 @@
   <p:timing>
     <p:tnLst>
       <p:par>
-        <p:cTn xmlns:p14="http://schemas.microsoft.com/office/powerpoint/2010/main" id="1" dur="indefinite" restart="never" nodeType="tmRoot"/>
+        <p:cTn id="1" dur="indefinite" restart="never" nodeType="tmRoot"/>
       </p:par>
     </p:tnLst>
   </p:timing>
@@ -7210,7 +7343,7 @@
   <p:timing>
     <p:tnLst>
       <p:par>
-        <p:cTn xmlns:p14="http://schemas.microsoft.com/office/powerpoint/2010/main" id="1" dur="indefinite" restart="never" nodeType="tmRoot"/>
+        <p:cTn id="1" dur="indefinite" restart="never" nodeType="tmRoot"/>
       </p:par>
     </p:tnLst>
   </p:timing>
@@ -7345,11 +7478,7 @@
             </a:pPr>
             <a:r>
               <a:rPr lang="en-US" dirty="0" smtClean="0"/>
-              <a:t>Fact</a:t>
-            </a:r>
-            <a:r>
-              <a:rPr lang="en-US" dirty="0" smtClean="0"/>
-              <a:t>: two elliptic curves (over an algebraically closed field) are isomorphic </a:t>
+              <a:t>Fact: two elliptic curves (over an algebraically closed field) are isomorphic </a:t>
             </a:r>
             <a:r>
               <a:rPr lang="en-US" dirty="0" err="1" smtClean="0"/>
@@ -7361,36 +7490,23 @@
             </a:r>
             <a:r>
               <a:rPr lang="en-US" dirty="0" smtClean="0"/>
-              <a:t>they have the same j-invariant</a:t>
-            </a:r>
+              <a:t>they have the same j-invariant.</a:t>
+            </a:r>
+          </a:p>
+          <a:p>
+            <a:pPr marL="0" indent="0">
+              <a:buNone/>
+            </a:pPr>
+            <a:endParaRPr lang="en-US" dirty="0"/>
+          </a:p>
+          <a:p>
+            <a:pPr marL="0" indent="0">
+              <a:buNone/>
+            </a:pPr>
             <a:r>
               <a:rPr lang="en-US" dirty="0" smtClean="0"/>
-              <a:t>.</a:t>
-            </a:r>
-          </a:p>
-          <a:p>
-            <a:pPr marL="0" indent="0">
-              <a:buNone/>
-            </a:pPr>
-            <a:endParaRPr lang="en-US" dirty="0"/>
-          </a:p>
-          <a:p>
-            <a:pPr marL="0" indent="0">
-              <a:buNone/>
-            </a:pPr>
-            <a:r>
-              <a:rPr lang="en-US" dirty="0" smtClean="0"/>
-              <a:t>There is a canonical </a:t>
-            </a:r>
-            <a:r>
-              <a:rPr lang="en-US" dirty="0" smtClean="0"/>
-              <a:t>curve E </a:t>
-            </a:r>
-            <a:r>
-              <a:rPr lang="en-US" dirty="0" smtClean="0"/>
-              <a:t>for each j:</a:t>
-            </a:r>
-            <a:endParaRPr lang="en-US" dirty="0" smtClean="0"/>
+              <a:t>There is a canonical curve E for each j:</a:t>
+            </a:r>
           </a:p>
           <a:p>
             <a:pPr marL="0" indent="0">
@@ -7415,7 +7531,7 @@
           <p:nvPr/>
         </p:nvPicPr>
         <p:blipFill>
-          <a:blip r:embed="rId2">
+          <a:blip r:embed="rId2" cstate="print">
             <a:extLst>
               <a:ext uri="{28A0092B-C50C-407E-A947-70E740481C1C}">
                 <a14:useLocalDpi xmlns:a14="http://schemas.microsoft.com/office/drawing/2010/main" val="0"/>
@@ -7445,7 +7561,7 @@
           <p:nvPr/>
         </p:nvPicPr>
         <p:blipFill>
-          <a:blip r:embed="rId3">
+          <a:blip r:embed="rId3" cstate="print">
             <a:extLst>
               <a:ext uri="{28A0092B-C50C-407E-A947-70E740481C1C}">
                 <a14:useLocalDpi xmlns:a14="http://schemas.microsoft.com/office/drawing/2010/main" val="0"/>
@@ -7479,7 +7595,7 @@
   <p:timing>
     <p:tnLst>
       <p:par>
-        <p:cTn xmlns:p14="http://schemas.microsoft.com/office/powerpoint/2010/main" id="1" dur="indefinite" restart="never" nodeType="tmRoot"/>
+        <p:cTn id="1" dur="indefinite" restart="never" nodeType="tmRoot"/>
       </p:par>
     </p:tnLst>
   </p:timing>
@@ -7683,7 +7799,7 @@
           <p:nvPr/>
         </p:nvPicPr>
         <p:blipFill>
-          <a:blip r:embed="rId3">
+          <a:blip r:embed="rId3" cstate="print">
             <a:extLst>
               <a:ext uri="{28A0092B-C50C-407E-A947-70E740481C1C}">
                 <a14:useLocalDpi xmlns:a14="http://schemas.microsoft.com/office/drawing/2010/main" val="0"/>
@@ -7713,7 +7829,7 @@
           <p:nvPr/>
         </p:nvPicPr>
         <p:blipFill>
-          <a:blip r:embed="rId4">
+          <a:blip r:embed="rId4" cstate="print">
             <a:extLst>
               <a:ext uri="{28A0092B-C50C-407E-A947-70E740481C1C}">
                 <a14:useLocalDpi xmlns:a14="http://schemas.microsoft.com/office/drawing/2010/main" val="0"/>
@@ -7747,7 +7863,7 @@
   <p:timing>
     <p:tnLst>
       <p:par>
-        <p:cTn xmlns:p14="http://schemas.microsoft.com/office/powerpoint/2010/main" id="1" dur="indefinite" restart="never" nodeType="tmRoot"/>
+        <p:cTn id="1" dur="indefinite" restart="never" nodeType="tmRoot"/>
       </p:par>
     </p:tnLst>
   </p:timing>
@@ -7921,7 +8037,7 @@
           <p:nvPr/>
         </p:nvPicPr>
         <p:blipFill>
-          <a:blip r:embed="rId2">
+          <a:blip r:embed="rId2" cstate="print">
             <a:extLst>
               <a:ext uri="{28A0092B-C50C-407E-A947-70E740481C1C}">
                 <a14:useLocalDpi xmlns:a14="http://schemas.microsoft.com/office/drawing/2010/main" val="0"/>
@@ -7951,7 +8067,7 @@
           <p:nvPr/>
         </p:nvPicPr>
         <p:blipFill>
-          <a:blip r:embed="rId3">
+          <a:blip r:embed="rId3" cstate="print">
             <a:extLst>
               <a:ext uri="{28A0092B-C50C-407E-A947-70E740481C1C}">
                 <a14:useLocalDpi xmlns:a14="http://schemas.microsoft.com/office/drawing/2010/main" val="0"/>
@@ -7981,7 +8097,7 @@
           <p:nvPr/>
         </p:nvPicPr>
         <p:blipFill>
-          <a:blip r:embed="rId4">
+          <a:blip r:embed="rId4" cstate="print">
             <a:extLst>
               <a:ext uri="{28A0092B-C50C-407E-A947-70E740481C1C}">
                 <a14:useLocalDpi xmlns:a14="http://schemas.microsoft.com/office/drawing/2010/main" val="0"/>
@@ -8011,7 +8127,7 @@
           <p:nvPr/>
         </p:nvPicPr>
         <p:blipFill>
-          <a:blip r:embed="rId5">
+          <a:blip r:embed="rId5" cstate="print">
             <a:extLst>
               <a:ext uri="{28A0092B-C50C-407E-A947-70E740481C1C}">
                 <a14:useLocalDpi xmlns:a14="http://schemas.microsoft.com/office/drawing/2010/main" val="0"/>
@@ -8041,7 +8157,7 @@
           <p:nvPr/>
         </p:nvPicPr>
         <p:blipFill>
-          <a:blip r:embed="rId2">
+          <a:blip r:embed="rId2" cstate="print">
             <a:extLst>
               <a:ext uri="{28A0092B-C50C-407E-A947-70E740481C1C}">
                 <a14:useLocalDpi xmlns:a14="http://schemas.microsoft.com/office/drawing/2010/main" val="0"/>
@@ -8075,7 +8191,7 @@
   <p:timing>
     <p:tnLst>
       <p:par>
-        <p:cTn xmlns:p14="http://schemas.microsoft.com/office/powerpoint/2010/main" id="1" dur="indefinite" restart="never" nodeType="tmRoot"/>
+        <p:cTn id="1" dur="indefinite" restart="never" nodeType="tmRoot"/>
       </p:par>
     </p:tnLst>
   </p:timing>
@@ -8309,7 +8425,7 @@
           <p:nvPr/>
         </p:nvPicPr>
         <p:blipFill>
-          <a:blip r:embed="rId3">
+          <a:blip r:embed="rId3" cstate="print">
             <a:extLst>
               <a:ext uri="{28A0092B-C50C-407E-A947-70E740481C1C}">
                 <a14:useLocalDpi xmlns:a14="http://schemas.microsoft.com/office/drawing/2010/main" val="0"/>
@@ -8339,7 +8455,7 @@
           <p:nvPr/>
         </p:nvPicPr>
         <p:blipFill>
-          <a:blip r:embed="rId4">
+          <a:blip r:embed="rId4" cstate="print">
             <a:extLst>
               <a:ext uri="{28A0092B-C50C-407E-A947-70E740481C1C}">
                 <a14:useLocalDpi xmlns:a14="http://schemas.microsoft.com/office/drawing/2010/main" val="0"/>
@@ -8373,7 +8489,7 @@
   <p:timing>
     <p:tnLst>
       <p:par>
-        <p:cTn xmlns:p14="http://schemas.microsoft.com/office/powerpoint/2010/main" id="1" dur="indefinite" restart="never" nodeType="tmRoot"/>
+        <p:cTn id="1" dur="indefinite" restart="never" nodeType="tmRoot"/>
       </p:par>
     </p:tnLst>
   </p:timing>
@@ -8753,7 +8869,7 @@
   <p:timing>
     <p:tnLst>
       <p:par>
-        <p:cTn xmlns:p14="http://schemas.microsoft.com/office/powerpoint/2010/main" id="1" dur="indefinite" restart="never" nodeType="tmRoot"/>
+        <p:cTn id="1" dur="indefinite" restart="never" nodeType="tmRoot"/>
       </p:par>
     </p:tnLst>
   </p:timing>
@@ -8916,6 +9032,16 @@
             </a:pPr>
             <a:endParaRPr lang="en-US" dirty="0" smtClean="0"/>
           </a:p>
+          <a:p>
+            <a:pPr marL="114300" indent="0">
+              <a:buNone/>
+            </a:pPr>
+            <a:r>
+              <a:rPr lang="en-US" dirty="0" smtClean="0"/>
+              <a:t>So given two parameters 		, we can construct any curve.</a:t>
+            </a:r>
+            <a:endParaRPr lang="en-US" dirty="0" smtClean="0"/>
+          </a:p>
         </p:txBody>
       </p:sp>
       <p:pic>
@@ -8927,7 +9053,7 @@
           <p:nvPr/>
         </p:nvPicPr>
         <p:blipFill>
-          <a:blip r:embed="rId2">
+          <a:blip r:embed="rId4">
             <a:extLst>
               <a:ext uri="{28A0092B-C50C-407E-A947-70E740481C1C}">
                 <a14:useLocalDpi xmlns:a14="http://schemas.microsoft.com/office/drawing/2010/main" val="0"/>
@@ -8950,7 +9076,7 @@
           <a:noFill/>
           <a:extLst>
             <a:ext uri="{909E8E84-426E-40dd-AFC4-6F175D3DCCD1}">
-              <a14:hiddenFill xmlns:a14="http://schemas.microsoft.com/office/drawing/2010/main">
+              <a14:hiddenFill xmlns:a14="http://schemas.microsoft.com/office/drawing/2010/main" xmlns="">
                 <a:solidFill>
                   <a:srgbClr val="FFFFFF"/>
                 </a:solidFill>
@@ -8968,7 +9094,7 @@
           <p:nvPr/>
         </p:nvPicPr>
         <p:blipFill>
-          <a:blip r:embed="rId3">
+          <a:blip r:embed="rId5" cstate="print">
             <a:extLst>
               <a:ext uri="{28A0092B-C50C-407E-A947-70E740481C1C}">
                 <a14:useLocalDpi xmlns:a14="http://schemas.microsoft.com/office/drawing/2010/main" val="0"/>
@@ -8998,7 +9124,7 @@
           <p:nvPr/>
         </p:nvPicPr>
         <p:blipFill>
-          <a:blip r:embed="rId4">
+          <a:blip r:embed="rId6" cstate="print">
             <a:extLst>
               <a:ext uri="{28A0092B-C50C-407E-A947-70E740481C1C}">
                 <a14:useLocalDpi xmlns:a14="http://schemas.microsoft.com/office/drawing/2010/main" val="0"/>
@@ -9028,7 +9154,7 @@
           <p:nvPr/>
         </p:nvPicPr>
         <p:blipFill>
-          <a:blip r:embed="rId5">
+          <a:blip r:embed="rId7" cstate="print">
             <a:extLst>
               <a:ext uri="{28A0092B-C50C-407E-A947-70E740481C1C}">
                 <a14:useLocalDpi xmlns:a14="http://schemas.microsoft.com/office/drawing/2010/main" val="0"/>
@@ -9043,6 +9169,74 @@
           <a:xfrm>
             <a:off x="1169376" y="4967060"/>
             <a:ext cx="8465053" cy="359466"/>
+          </a:xfrm>
+          <a:prstGeom prst="rect">
+            <a:avLst/>
+          </a:prstGeom>
+        </p:spPr>
+      </p:pic>
+      <p:pic>
+        <p:nvPicPr>
+          <p:cNvPr id="7" name="Picture 6"/>
+          <p:cNvPicPr>
+            <a:picLocks noChangeAspect="1"/>
+          </p:cNvPicPr>
+          <p:nvPr>
+            <p:custDataLst>
+              <p:tags r:id="rId1"/>
+            </p:custDataLst>
+          </p:nvPr>
+        </p:nvPicPr>
+        <p:blipFill>
+          <a:blip r:embed="rId8" cstate="print">
+            <a:extLst>
+              <a:ext uri="{28A0092B-C50C-407E-A947-70E740481C1C}">
+                <a14:useLocalDpi xmlns:a14="http://schemas.microsoft.com/office/drawing/2010/main" val="0"/>
+              </a:ext>
+            </a:extLst>
+          </a:blip>
+          <a:stretch>
+            <a:fillRect/>
+          </a:stretch>
+        </p:blipFill>
+        <p:spPr>
+          <a:xfrm>
+            <a:off x="7969790" y="4061504"/>
+            <a:ext cx="1665732" cy="211836"/>
+          </a:xfrm>
+          <a:prstGeom prst="rect">
+            <a:avLst/>
+          </a:prstGeom>
+        </p:spPr>
+      </p:pic>
+      <p:pic>
+        <p:nvPicPr>
+          <p:cNvPr id="8" name="Picture 7"/>
+          <p:cNvPicPr>
+            <a:picLocks noChangeAspect="1"/>
+          </p:cNvPicPr>
+          <p:nvPr>
+            <p:custDataLst>
+              <p:tags r:id="rId2"/>
+            </p:custDataLst>
+          </p:nvPr>
+        </p:nvPicPr>
+        <p:blipFill>
+          <a:blip r:embed="rId9" cstate="print">
+            <a:extLst>
+              <a:ext uri="{28A0092B-C50C-407E-A947-70E740481C1C}">
+                <a14:useLocalDpi xmlns:a14="http://schemas.microsoft.com/office/drawing/2010/main" val="0"/>
+              </a:ext>
+            </a:extLst>
+          </a:blip>
+          <a:stretch>
+            <a:fillRect/>
+          </a:stretch>
+        </p:blipFill>
+        <p:spPr>
+          <a:xfrm>
+            <a:off x="4652173" y="5710307"/>
+            <a:ext cx="1228939" cy="312442"/>
           </a:xfrm>
           <a:prstGeom prst="rect">
             <a:avLst/>
@@ -9062,11 +9256,91 @@
   <p:timing>
     <p:tnLst>
       <p:par>
-        <p:cTn xmlns:p14="http://schemas.microsoft.com/office/powerpoint/2010/main" id="1" dur="indefinite" restart="never" nodeType="tmRoot"/>
+        <p:cTn id="1" dur="indefinite" restart="never" nodeType="tmRoot"/>
       </p:par>
     </p:tnLst>
   </p:timing>
 </p:sld>
+</file>
+
+<file path=ppt/tags/tag1.xml><?xml version="1.0" encoding="utf-8"?>
+<p:tagLst xmlns:a="http://schemas.openxmlformats.org/drawingml/2006/main" xmlns:r="http://schemas.openxmlformats.org/officeDocument/2006/relationships" xmlns:p="http://schemas.openxmlformats.org/presentationml/2006/main">
+  <p:tag name="ORIGINALHEIGHT" val="104.25"/>
+  <p:tag name="ORIGINALWIDTH" val="819.75"/>
+  <p:tag name="OUTPUTDPI" val="1200"/>
+  <p:tag name="LATEXADDIN" val="\documentclass{article}&#10;\usepackage{amsmath}&#10;\usepackage{amsfonts}&#10;\pagestyle{empty}&#10;\begin{document}&#10;&#10;&#10;$L = \mathbb{Z}\omega_{1} + \mathbb{Z}\omega_{2} $&#10;&#10;\end{document}"/>
+  <p:tag name="IGUANATEXSIZE" val="20"/>
+  <p:tag name="IGUANATEXCURSOR" val="65"/>
+  <p:tag name="TRANSPARENCY" val="True"/>
+  <p:tag name="FILENAME" val=""/>
+  <p:tag name="INPUTTYPE" val="0"/>
+  <p:tag name="LATEXENGINEID" val="0"/>
+  <p:tag name="TEMPFOLDER" val="c:\temp\"/>
+</p:tagLst>
+</file>
+
+<file path=ppt/tags/tag2.xml><?xml version="1.0" encoding="utf-8"?>
+<p:tagLst xmlns:a="http://schemas.openxmlformats.org/drawingml/2006/main" xmlns:r="http://schemas.openxmlformats.org/officeDocument/2006/relationships" xmlns:p="http://schemas.openxmlformats.org/presentationml/2006/main">
+  <p:tag name="ORIGINALHEIGHT" val="78.75"/>
+  <p:tag name="ORIGINALWIDTH" val="309.75"/>
+  <p:tag name="OUTPUTDPI" val="1200"/>
+  <p:tag name="LATEXADDIN" val="\documentclass{article}&#10;\usepackage{amsmath}&#10;\pagestyle{empty}&#10;\begin{document}&#10;&#10;$\omega_{1}, \omega_{2}$ &#10;&#10;&#10;&#10;\end{document}"/>
+  <p:tag name="IGUANATEXSIZE" val="20"/>
+  <p:tag name="IGUANATEXCURSOR" val="106"/>
+  <p:tag name="TRANSPARENCY" val="True"/>
+  <p:tag name="FILENAME" val=""/>
+  <p:tag name="INPUTTYPE" val="0"/>
+  <p:tag name="LATEXENGINEID" val="0"/>
+  <p:tag name="TEMPFOLDER" val="c:\temp\"/>
+</p:tagLst>
+</file>
+
+<file path=ppt/tags/tag3.xml><?xml version="1.0" encoding="utf-8"?>
+<p:tagLst xmlns:a="http://schemas.openxmlformats.org/drawingml/2006/main" xmlns:r="http://schemas.openxmlformats.org/officeDocument/2006/relationships" xmlns:p="http://schemas.openxmlformats.org/presentationml/2006/main">
+  <p:tag name="ORIGINALHEIGHT" val="111.75"/>
+  <p:tag name="ORIGINALWIDTH" val="387.75"/>
+  <p:tag name="OUTPUTDPI" val="1200"/>
+  <p:tag name="LATEXADDIN" val="\documentclass{article}&#10;\usepackage{amsmath}&#10;\pagestyle{empty}&#10;\begin{document}&#10;&#10;&#10;$z \rightarrow \beta z$&#10;&#10;\end{document}"/>
+  <p:tag name="IGUANATEXSIZE" val="20"/>
+  <p:tag name="IGUANATEXCURSOR" val="105"/>
+  <p:tag name="TRANSPARENCY" val="True"/>
+  <p:tag name="FILENAME" val=""/>
+  <p:tag name="INPUTTYPE" val="0"/>
+  <p:tag name="LATEXENGINEID" val="0"/>
+  <p:tag name="TEMPFOLDER" val="c:\temp\"/>
+</p:tagLst>
+</file>
+
+<file path=ppt/tags/tag4.xml><?xml version="1.0" encoding="utf-8"?>
+<p:tagLst xmlns:a="http://schemas.openxmlformats.org/drawingml/2006/main" xmlns:r="http://schemas.openxmlformats.org/officeDocument/2006/relationships" xmlns:p="http://schemas.openxmlformats.org/presentationml/2006/main">
+  <p:tag name="ORIGINALHEIGHT" val="111.75"/>
+  <p:tag name="ORIGINALWIDTH" val="69"/>
+  <p:tag name="OUTPUTDPI" val="1200"/>
+  <p:tag name="LATEXADDIN" val="\documentclass{article}&#10;\usepackage{amsmath}&#10;\pagestyle{empty}&#10;\begin{document}&#10;&#10;&#10;$\beta$ &#10;&#10;\end{document}"/>
+  <p:tag name="IGUANATEXSIZE" val="20"/>
+  <p:tag name="IGUANATEXCURSOR" val="90"/>
+  <p:tag name="TRANSPARENCY" val="True"/>
+  <p:tag name="FILENAME" val=""/>
+  <p:tag name="INPUTTYPE" val="0"/>
+  <p:tag name="LATEXENGINEID" val="0"/>
+  <p:tag name="TEMPFOLDER" val="c:\temp\"/>
+</p:tagLst>
+</file>
+
+<file path=ppt/tags/tag5.xml><?xml version="1.0" encoding="utf-8"?>
+<p:tagLst xmlns:a="http://schemas.openxmlformats.org/drawingml/2006/main" xmlns:r="http://schemas.openxmlformats.org/officeDocument/2006/relationships" xmlns:p="http://schemas.openxmlformats.org/presentationml/2006/main">
+  <p:tag name="ORIGINALHEIGHT" val="128.25"/>
+  <p:tag name="ORIGINALWIDTH" val="831"/>
+  <p:tag name="OUTPUTDPI" val="1200"/>
+  <p:tag name="LATEXADDIN" val="\documentclass{article}&#10;\usepackage{amsmath}&#10;\pagestyle{empty}&#10;\begin{document}&#10;&#10;&#10;$x^{2} - tx + p = 0$&#10;&#10;\end{document}"/>
+  <p:tag name="IGUANATEXSIZE" val="20"/>
+  <p:tag name="IGUANATEXCURSOR" val="102"/>
+  <p:tag name="TRANSPARENCY" val="True"/>
+  <p:tag name="FILENAME" val=""/>
+  <p:tag name="INPUTTYPE" val="0"/>
+  <p:tag name="LATEXENGINEID" val="0"/>
+  <p:tag name="TEMPFOLDER" val="c:\temp\"/>
+</p:tagLst>
 </file>
 
 <file path=ppt/theme/theme1.xml><?xml version="1.0" encoding="utf-8"?>

</xml_diff>

<commit_message>
should be final draft. i removed something before section 2.7.2 because it didnt make much sense.
</commit_message>
<xml_diff>
--- a/Presentation.ppt.pptx
+++ b/Presentation.ppt.pptx
@@ -119,7 +119,7 @@
   </p:defaultTextStyle>
   <p:extLst>
     <p:ext uri="{EFAFB233-063F-42B5-8137-9DF3F51BA10A}">
-      <p15:sldGuideLst xmlns:p15="http://schemas.microsoft.com/office/powerpoint/2012/main" xmlns="">
+      <p15:sldGuideLst xmlns="" xmlns:p15="http://schemas.microsoft.com/office/powerpoint/2012/main">
         <p15:guide id="1" orient="horz" pos="2160">
           <p15:clr>
             <a:srgbClr val="A4A3A4"/>
@@ -261,7 +261,7 @@
           <a:p>
             <a:fld id="{0A2C9084-70B7-4828-AD77-7D77F1A8B45B}" type="datetimeFigureOut">
               <a:rPr lang="en-US" smtClean="0"/>
-              <a:t>12/2/15</a:t>
+              <a:t>12/3/15</a:t>
             </a:fld>
             <a:endParaRPr lang="en-US"/>
           </a:p>
@@ -894,7 +894,7 @@
           <a:p>
             <a:fld id="{0A2C9084-70B7-4828-AD77-7D77F1A8B45B}" type="datetimeFigureOut">
               <a:rPr lang="en-US" smtClean="0"/>
-              <a:t>12/2/15</a:t>
+              <a:t>12/3/15</a:t>
             </a:fld>
             <a:endParaRPr lang="en-US"/>
           </a:p>
@@ -1171,7 +1171,7 @@
           <a:p>
             <a:fld id="{0A2C9084-70B7-4828-AD77-7D77F1A8B45B}" type="datetimeFigureOut">
               <a:rPr lang="en-US" smtClean="0"/>
-              <a:t>12/2/15</a:t>
+              <a:t>12/3/15</a:t>
             </a:fld>
             <a:endParaRPr lang="en-US"/>
           </a:p>
@@ -1336,7 +1336,7 @@
           <a:p>
             <a:fld id="{0A2C9084-70B7-4828-AD77-7D77F1A8B45B}" type="datetimeFigureOut">
               <a:rPr lang="en-US" smtClean="0"/>
-              <a:t>12/2/15</a:t>
+              <a:t>12/3/15</a:t>
             </a:fld>
             <a:endParaRPr lang="en-US"/>
           </a:p>
@@ -1517,7 +1517,7 @@
           <a:p>
             <a:fld id="{0A2C9084-70B7-4828-AD77-7D77F1A8B45B}" type="datetimeFigureOut">
               <a:rPr lang="en-US" smtClean="0"/>
-              <a:t>12/2/15</a:t>
+              <a:t>12/3/15</a:t>
             </a:fld>
             <a:endParaRPr lang="en-US"/>
           </a:p>
@@ -2162,7 +2162,7 @@
           <a:p>
             <a:fld id="{0A2C9084-70B7-4828-AD77-7D77F1A8B45B}" type="datetimeFigureOut">
               <a:rPr lang="en-US" smtClean="0"/>
-              <a:t>12/2/15</a:t>
+              <a:t>12/3/15</a:t>
             </a:fld>
             <a:endParaRPr lang="en-US"/>
           </a:p>
@@ -2588,7 +2588,7 @@
           <a:p>
             <a:fld id="{0A2C9084-70B7-4828-AD77-7D77F1A8B45B}" type="datetimeFigureOut">
               <a:rPr lang="en-US" smtClean="0"/>
-              <a:t>12/2/15</a:t>
+              <a:t>12/3/15</a:t>
             </a:fld>
             <a:endParaRPr lang="en-US"/>
           </a:p>
@@ -2701,7 +2701,7 @@
           <a:p>
             <a:fld id="{0A2C9084-70B7-4828-AD77-7D77F1A8B45B}" type="datetimeFigureOut">
               <a:rPr lang="en-US" smtClean="0"/>
-              <a:t>12/2/15</a:t>
+              <a:t>12/3/15</a:t>
             </a:fld>
             <a:endParaRPr lang="en-US"/>
           </a:p>
@@ -2882,7 +2882,7 @@
           <a:p>
             <a:fld id="{0A2C9084-70B7-4828-AD77-7D77F1A8B45B}" type="datetimeFigureOut">
               <a:rPr lang="en-US" smtClean="0"/>
-              <a:t>12/2/15</a:t>
+              <a:t>12/3/15</a:t>
             </a:fld>
             <a:endParaRPr lang="en-US"/>
           </a:p>
@@ -3148,7 +3148,7 @@
           <a:p>
             <a:fld id="{0A2C9084-70B7-4828-AD77-7D77F1A8B45B}" type="datetimeFigureOut">
               <a:rPr lang="en-US" smtClean="0"/>
-              <a:t>12/2/15</a:t>
+              <a:t>12/3/15</a:t>
             </a:fld>
             <a:endParaRPr lang="en-US"/>
           </a:p>
@@ -3618,7 +3618,7 @@
           <a:p>
             <a:fld id="{0A2C9084-70B7-4828-AD77-7D77F1A8B45B}" type="datetimeFigureOut">
               <a:rPr lang="en-US" smtClean="0"/>
-              <a:t>12/2/15</a:t>
+              <a:t>12/3/15</a:t>
             </a:fld>
             <a:endParaRPr lang="en-US"/>
           </a:p>
@@ -4178,7 +4178,7 @@
           <a:p>
             <a:fld id="{0A2C9084-70B7-4828-AD77-7D77F1A8B45B}" type="datetimeFigureOut">
               <a:rPr lang="en-US" smtClean="0"/>
-              <a:t>12/2/15</a:t>
+              <a:t>12/3/15</a:t>
             </a:fld>
             <a:endParaRPr lang="en-US"/>
           </a:p>
@@ -4964,11 +4964,7 @@
             </a:r>
             <a:r>
               <a:rPr lang="en-US" dirty="0" smtClean="0"/>
-              <a:t> of elliptic curves </a:t>
-            </a:r>
-            <a:r>
-              <a:rPr lang="en-US" dirty="0" smtClean="0"/>
-              <a:t>correspond to multiplying the lattice by a constant (               ) that preserves the lattice.		</a:t>
+              <a:t> of elliptic curves correspond to multiplying the lattice by a constant (               ) that preserves the lattice.		</a:t>
             </a:r>
             <a:endParaRPr lang="en-US" dirty="0"/>
           </a:p>
@@ -5008,19 +5004,7 @@
             </a:pPr>
             <a:r>
               <a:rPr lang="en-US" dirty="0" smtClean="0"/>
-              <a:t>This ring has discriminant           or           </a:t>
-            </a:r>
-            <a:r>
-              <a:rPr lang="en-US" dirty="0" smtClean="0"/>
-              <a:t> </a:t>
-            </a:r>
-            <a:r>
-              <a:rPr lang="en-US" dirty="0" smtClean="0"/>
-              <a:t>, called the CM </a:t>
-            </a:r>
-            <a:r>
-              <a:rPr lang="en-US" dirty="0" smtClean="0"/>
-              <a:t>discriminant. </a:t>
+              <a:t>This ring has discriminant           or            , called the CM discriminant. </a:t>
             </a:r>
             <a:r>
               <a:rPr lang="en-US" dirty="0"/>
@@ -5028,11 +5012,7 @@
             </a:r>
             <a:r>
               <a:rPr lang="en-US" dirty="0" smtClean="0"/>
-              <a:t>his </a:t>
-            </a:r>
-            <a:r>
-              <a:rPr lang="en-US" dirty="0" smtClean="0"/>
-              <a:t>ring can be treated as a lattice on its own. </a:t>
+              <a:t>his ring can be treated as a lattice on its own. </a:t>
             </a:r>
           </a:p>
           <a:p>
@@ -5452,13 +5432,8 @@
             </a:pPr>
             <a:r>
               <a:rPr lang="en-US" dirty="0" smtClean="0"/>
-              <a:t>From this, we get the CM equation, </a:t>
-            </a:r>
-            <a:r>
-              <a:rPr lang="en-US" dirty="0" smtClean="0"/>
-              <a:t>or essentially the “discriminant”</a:t>
-            </a:r>
-            <a:endParaRPr lang="en-US" dirty="0" smtClean="0"/>
+              <a:t>From this, we get the CM equation, or essentially the “discriminant”</a:t>
+            </a:r>
           </a:p>
           <a:p>
             <a:pPr marL="114300" indent="0">
@@ -6588,15 +6563,7 @@
             </a:pPr>
             <a:r>
               <a:rPr lang="en-US" dirty="0" smtClean="0"/>
-              <a:t>So the 3 conditions are satisfied. We can then</a:t>
-            </a:r>
-            <a:r>
-              <a:rPr lang="en-US" dirty="0" smtClean="0"/>
-              <a:t> </a:t>
-            </a:r>
-            <a:r>
-              <a:rPr lang="en-US" dirty="0" smtClean="0"/>
-              <a:t>construct E using the CM method. </a:t>
+              <a:t>So the 3 conditions are satisfied. We can then construct E using the CM method. </a:t>
             </a:r>
           </a:p>
           <a:p>
@@ -6957,7 +6924,15 @@
             </a:pPr>
             <a:r>
               <a:rPr lang="en-US" dirty="0" smtClean="0"/>
-              <a:t>Reason: We need the tangent line at each point on the curve to be defined, so                and              cannot simultaneously be 0. Applying </a:t>
+              <a:t>Reason: We need the tangent line at each point on the curve to be defined, so               </a:t>
+            </a:r>
+            <a:r>
+              <a:rPr lang="en-US" dirty="0" smtClean="0"/>
+              <a:t>and               </a:t>
+            </a:r>
+            <a:r>
+              <a:rPr lang="en-US" dirty="0" smtClean="0"/>
+              <a:t>cannot simultaneously be 0. Applying </a:t>
             </a:r>
             <a:r>
               <a:rPr lang="en-US" dirty="0" err="1" smtClean="0"/>
@@ -7044,14 +7019,14 @@
       </p:pic>
       <p:pic>
         <p:nvPicPr>
-          <p:cNvPr id="4" name="Picture 3" descr="latex-image-1.pdf"/>
+          <p:cNvPr id="10" name="Picture 9" descr="latex-image-1.pdf"/>
           <p:cNvPicPr>
             <a:picLocks noChangeAspect="1"/>
           </p:cNvPicPr>
           <p:nvPr/>
         </p:nvPicPr>
         <p:blipFill>
-          <a:blip r:embed="rId4" cstate="print">
+          <a:blip r:embed="rId4">
             <a:extLst>
               <a:ext uri="{28A0092B-C50C-407E-A947-70E740481C1C}">
                 <a14:useLocalDpi xmlns:a14="http://schemas.microsoft.com/office/drawing/2010/main" val="0"/>
@@ -7064,8 +7039,8 @@
         </p:blipFill>
         <p:spPr>
           <a:xfrm>
-            <a:off x="2527361" y="4832367"/>
-            <a:ext cx="1018488" cy="356654"/>
+            <a:off x="4389453" y="4859599"/>
+            <a:ext cx="929322" cy="320797"/>
           </a:xfrm>
           <a:prstGeom prst="rect">
             <a:avLst/>
@@ -7074,14 +7049,14 @@
       </p:pic>
       <p:pic>
         <p:nvPicPr>
-          <p:cNvPr id="5" name="Picture 4" descr="latex-image-1.pdf"/>
+          <p:cNvPr id="11" name="Picture 10" descr="latex-image-1.pdf"/>
           <p:cNvPicPr>
             <a:picLocks noChangeAspect="1"/>
           </p:cNvPicPr>
           <p:nvPr/>
         </p:nvPicPr>
         <p:blipFill>
-          <a:blip r:embed="rId5" cstate="print">
+          <a:blip r:embed="rId5">
             <a:extLst>
               <a:ext uri="{28A0092B-C50C-407E-A947-70E740481C1C}">
                 <a14:useLocalDpi xmlns:a14="http://schemas.microsoft.com/office/drawing/2010/main" val="0"/>
@@ -7094,8 +7069,8 @@
         </p:blipFill>
         <p:spPr>
           <a:xfrm>
-            <a:off x="4389955" y="4841310"/>
-            <a:ext cx="955557" cy="339521"/>
+            <a:off x="2509460" y="4859816"/>
+            <a:ext cx="939243" cy="320797"/>
           </a:xfrm>
           <a:prstGeom prst="rect">
             <a:avLst/>
@@ -7676,16 +7651,174 @@
           </a:p>
         </p:txBody>
       </p:sp>
+      <p:sp>
+        <p:nvSpPr>
+          <p:cNvPr id="10" name="Content Placeholder 10"/>
+          <p:cNvSpPr>
+            <a:spLocks noGrp="1"/>
+          </p:cNvSpPr>
+          <p:nvPr>
+            <p:ph idx="1"/>
+          </p:nvPr>
+        </p:nvSpPr>
+        <p:spPr>
+          <a:xfrm>
+            <a:off x="609600" y="1752601"/>
+            <a:ext cx="10972800" cy="5641401"/>
+          </a:xfrm>
+        </p:spPr>
+        <p:txBody>
+          <a:bodyPr>
+            <a:normAutofit/>
+          </a:bodyPr>
+          <a:lstStyle/>
+          <a:p>
+            <a:pPr marL="0" indent="0">
+              <a:buNone/>
+            </a:pPr>
+            <a:r>
+              <a:rPr lang="en-US" dirty="0" smtClean="0"/>
+              <a:t>A map							satisfying</a:t>
+            </a:r>
+          </a:p>
+          <a:p>
+            <a:pPr marL="0" indent="0">
+              <a:buNone/>
+            </a:pPr>
+            <a:endParaRPr lang="en-US" dirty="0"/>
+          </a:p>
+          <a:p>
+            <a:pPr marL="0" indent="0">
+              <a:buNone/>
+            </a:pPr>
+            <a:endParaRPr lang="en-US" dirty="0" smtClean="0"/>
+          </a:p>
+          <a:p>
+            <a:pPr marL="0" indent="0">
+              <a:buNone/>
+            </a:pPr>
+            <a:endParaRPr lang="en-US" dirty="0"/>
+          </a:p>
+          <a:p>
+            <a:pPr marL="0" indent="0">
+              <a:buNone/>
+            </a:pPr>
+            <a:endParaRPr lang="en-US" dirty="0"/>
+          </a:p>
+          <a:p>
+            <a:pPr marL="0" indent="0">
+              <a:buNone/>
+            </a:pPr>
+            <a:endParaRPr lang="en-US" dirty="0"/>
+          </a:p>
+          <a:p>
+            <a:pPr marL="0" indent="0">
+              <a:buNone/>
+            </a:pPr>
+            <a:r>
+              <a:rPr lang="en-US" dirty="0" smtClean="0"/>
+              <a:t>For elliptic curves, there are two pairings: </a:t>
+            </a:r>
+            <a:endParaRPr lang="en-US" dirty="0" smtClean="0"/>
+          </a:p>
+          <a:p>
+            <a:pPr marL="0" indent="0">
+              <a:buNone/>
+            </a:pPr>
+            <a:r>
+              <a:rPr lang="en-US" dirty="0" smtClean="0"/>
+              <a:t>The Weil Pairing				, where</a:t>
+            </a:r>
+          </a:p>
+          <a:p>
+            <a:pPr marL="0" indent="0">
+              <a:buNone/>
+            </a:pPr>
+            <a:r>
+              <a:rPr lang="en-US" dirty="0" smtClean="0"/>
+              <a:t>and	   </a:t>
+            </a:r>
+            <a:r>
+              <a:rPr lang="en-US" dirty="0"/>
+              <a:t> </a:t>
+            </a:r>
+            <a:r>
+              <a:rPr lang="en-US" dirty="0" smtClean="0"/>
+              <a:t>is the set of </a:t>
+            </a:r>
+            <a:r>
+              <a:rPr lang="en-US" dirty="0" err="1" smtClean="0"/>
+              <a:t>rth</a:t>
+            </a:r>
+            <a:r>
+              <a:rPr lang="en-US" dirty="0" smtClean="0"/>
+              <a:t> roots of unity in</a:t>
+            </a:r>
+          </a:p>
+          <a:p>
+            <a:pPr marL="0" indent="0">
+              <a:buNone/>
+            </a:pPr>
+            <a:r>
+              <a:rPr lang="en-US" dirty="0" smtClean="0"/>
+              <a:t>The Tate Pairing</a:t>
+            </a:r>
+          </a:p>
+          <a:p>
+            <a:pPr marL="0" indent="0">
+              <a:buNone/>
+            </a:pPr>
+            <a:r>
+              <a:rPr lang="en-US" dirty="0" smtClean="0"/>
+              <a:t>where</a:t>
+            </a:r>
+            <a:endParaRPr lang="en-US" dirty="0" smtClean="0"/>
+          </a:p>
+          <a:p>
+            <a:pPr marL="0" indent="0">
+              <a:buNone/>
+            </a:pPr>
+            <a:r>
+              <a:rPr lang="en-US" dirty="0" smtClean="0"/>
+              <a:t> </a:t>
+            </a:r>
+            <a:endParaRPr lang="en-US" dirty="0" smtClean="0"/>
+          </a:p>
+        </p:txBody>
+      </p:sp>
+      <p:sp>
+        <p:nvSpPr>
+          <p:cNvPr id="2" name="Title 1"/>
+          <p:cNvSpPr>
+            <a:spLocks noGrp="1"/>
+          </p:cNvSpPr>
+          <p:nvPr>
+            <p:ph type="title"/>
+          </p:nvPr>
+        </p:nvSpPr>
+        <p:spPr/>
+        <p:txBody>
+          <a:bodyPr/>
+          <a:lstStyle/>
+          <a:p>
+            <a:r>
+              <a:rPr lang="en-US" dirty="0" smtClean="0"/>
+              <a:t>Pairings</a:t>
+            </a:r>
+            <a:endParaRPr lang="en-US" dirty="0"/>
+          </a:p>
+        </p:txBody>
+      </p:sp>
       <p:pic>
         <p:nvPicPr>
-          <p:cNvPr id="15" name="Picture 14" descr="Screen Shot 2015-11-26 at 3.06.31 PM.png"/>
+          <p:cNvPr id="5" name="Picture 4" descr="latex-image-1.pdf"/>
           <p:cNvPicPr>
             <a:picLocks noChangeAspect="1"/>
           </p:cNvPicPr>
           <p:nvPr/>
         </p:nvPicPr>
         <p:blipFill>
-          <a:blip r:embed="rId2">
+          <a:blip r:embed="rId2" cstate="print">
             <a:extLst>
               <a:ext uri="{28A0092B-C50C-407E-A947-70E740481C1C}">
                 <a14:useLocalDpi xmlns:a14="http://schemas.microsoft.com/office/drawing/2010/main" val="0"/>
@@ -7698,111 +7831,17 @@
         </p:blipFill>
         <p:spPr>
           <a:xfrm>
-            <a:off x="880083" y="4801797"/>
-            <a:ext cx="10870746" cy="1485621"/>
+            <a:off x="1634610" y="2327863"/>
+            <a:ext cx="4811101" cy="1558359"/>
           </a:xfrm>
           <a:prstGeom prst="rect">
             <a:avLst/>
           </a:prstGeom>
         </p:spPr>
       </p:pic>
-      <p:sp>
-        <p:nvSpPr>
-          <p:cNvPr id="10" name="Content Placeholder 10"/>
-          <p:cNvSpPr>
-            <a:spLocks noGrp="1"/>
-          </p:cNvSpPr>
-          <p:nvPr>
-            <p:ph idx="1"/>
-          </p:nvPr>
-        </p:nvSpPr>
-        <p:spPr>
-          <a:xfrm>
-            <a:off x="609600" y="1752601"/>
-            <a:ext cx="10972800" cy="4373563"/>
-          </a:xfrm>
-        </p:spPr>
-        <p:txBody>
-          <a:bodyPr>
-            <a:normAutofit/>
-          </a:bodyPr>
-          <a:lstStyle/>
-          <a:p>
-            <a:pPr marL="0" indent="0">
-              <a:buNone/>
-            </a:pPr>
-            <a:r>
-              <a:rPr lang="en-US" dirty="0" smtClean="0"/>
-              <a:t>A map							satisfying</a:t>
-            </a:r>
-          </a:p>
-          <a:p>
-            <a:pPr marL="0" indent="0">
-              <a:buNone/>
-            </a:pPr>
-            <a:endParaRPr lang="en-US" dirty="0"/>
-          </a:p>
-          <a:p>
-            <a:pPr marL="0" indent="0">
-              <a:buNone/>
-            </a:pPr>
-            <a:endParaRPr lang="en-US" dirty="0" smtClean="0"/>
-          </a:p>
-          <a:p>
-            <a:pPr marL="0" indent="0">
-              <a:buNone/>
-            </a:pPr>
-            <a:endParaRPr lang="en-US" dirty="0"/>
-          </a:p>
-          <a:p>
-            <a:pPr marL="0" indent="0">
-              <a:buNone/>
-            </a:pPr>
-            <a:endParaRPr lang="en-US" dirty="0"/>
-          </a:p>
-          <a:p>
-            <a:pPr marL="0" indent="0">
-              <a:buNone/>
-            </a:pPr>
-            <a:endParaRPr lang="en-US" dirty="0"/>
-          </a:p>
-          <a:p>
-            <a:pPr marL="0" indent="0">
-              <a:buNone/>
-            </a:pPr>
-            <a:r>
-              <a:rPr lang="en-US" dirty="0" smtClean="0"/>
-              <a:t>For elliptic curves, there are two pairings:  </a:t>
-            </a:r>
-          </a:p>
-        </p:txBody>
-      </p:sp>
-      <p:sp>
-        <p:nvSpPr>
-          <p:cNvPr id="2" name="Title 1"/>
-          <p:cNvSpPr>
-            <a:spLocks noGrp="1"/>
-          </p:cNvSpPr>
-          <p:nvPr>
-            <p:ph type="title"/>
-          </p:nvPr>
-        </p:nvSpPr>
-        <p:spPr/>
-        <p:txBody>
-          <a:bodyPr/>
-          <a:lstStyle/>
-          <a:p>
-            <a:r>
-              <a:rPr lang="en-US" dirty="0" smtClean="0"/>
-              <a:t>Pairings</a:t>
-            </a:r>
-            <a:endParaRPr lang="en-US" dirty="0"/>
-          </a:p>
-        </p:txBody>
-      </p:sp>
       <p:pic>
         <p:nvPicPr>
-          <p:cNvPr id="5" name="Picture 4" descr="latex-image-1.pdf"/>
+          <p:cNvPr id="8" name="Picture 7" descr="latex-image-1.pdf"/>
           <p:cNvPicPr>
             <a:picLocks noChangeAspect="1"/>
           </p:cNvPicPr>
@@ -7822,8 +7861,8 @@
         </p:blipFill>
         <p:spPr>
           <a:xfrm>
-            <a:off x="1634610" y="2327863"/>
-            <a:ext cx="4811101" cy="1558359"/>
+            <a:off x="1860942" y="1793367"/>
+            <a:ext cx="5854738" cy="402143"/>
           </a:xfrm>
           <a:prstGeom prst="rect">
             <a:avLst/>
@@ -7832,14 +7871,14 @@
       </p:pic>
       <p:pic>
         <p:nvPicPr>
-          <p:cNvPr id="8" name="Picture 7" descr="latex-image-1.pdf"/>
+          <p:cNvPr id="3" name="Picture 2" descr="latex-image-1.pdf"/>
           <p:cNvPicPr>
             <a:picLocks noChangeAspect="1"/>
           </p:cNvPicPr>
           <p:nvPr/>
         </p:nvPicPr>
         <p:blipFill>
-          <a:blip r:embed="rId4" cstate="print">
+          <a:blip r:embed="rId4">
             <a:extLst>
               <a:ext uri="{28A0092B-C50C-407E-A947-70E740481C1C}">
                 <a14:useLocalDpi xmlns:a14="http://schemas.microsoft.com/office/drawing/2010/main" val="0"/>
@@ -7852,8 +7891,158 @@
         </p:blipFill>
         <p:spPr>
           <a:xfrm>
-            <a:off x="1860942" y="1793367"/>
-            <a:ext cx="5854738" cy="402143"/>
+            <a:off x="3168631" y="4918372"/>
+            <a:ext cx="2942301" cy="327673"/>
+          </a:xfrm>
+          <a:prstGeom prst="rect">
+            <a:avLst/>
+          </a:prstGeom>
+        </p:spPr>
+      </p:pic>
+      <p:pic>
+        <p:nvPicPr>
+          <p:cNvPr id="6" name="Picture 5" descr="latex-image-1.pdf"/>
+          <p:cNvPicPr>
+            <a:picLocks noChangeAspect="1"/>
+          </p:cNvPicPr>
+          <p:nvPr/>
+        </p:nvPicPr>
+        <p:blipFill>
+          <a:blip r:embed="rId5">
+            <a:extLst>
+              <a:ext uri="{28A0092B-C50C-407E-A947-70E740481C1C}">
+                <a14:useLocalDpi xmlns:a14="http://schemas.microsoft.com/office/drawing/2010/main" val="0"/>
+              </a:ext>
+            </a:extLst>
+          </a:blip>
+          <a:stretch>
+            <a:fillRect/>
+          </a:stretch>
+        </p:blipFill>
+        <p:spPr>
+          <a:xfrm>
+            <a:off x="7393472" y="4917470"/>
+            <a:ext cx="3704595" cy="335120"/>
+          </a:xfrm>
+          <a:prstGeom prst="rect">
+            <a:avLst/>
+          </a:prstGeom>
+        </p:spPr>
+      </p:pic>
+      <p:pic>
+        <p:nvPicPr>
+          <p:cNvPr id="7" name="Picture 6" descr="latex-image-1.pdf"/>
+          <p:cNvPicPr>
+            <a:picLocks noChangeAspect="1"/>
+          </p:cNvPicPr>
+          <p:nvPr/>
+        </p:nvPicPr>
+        <p:blipFill>
+          <a:blip r:embed="rId6">
+            <a:extLst>
+              <a:ext uri="{28A0092B-C50C-407E-A947-70E740481C1C}">
+                <a14:useLocalDpi xmlns:a14="http://schemas.microsoft.com/office/drawing/2010/main" val="0"/>
+              </a:ext>
+            </a:extLst>
+          </a:blip>
+          <a:stretch>
+            <a:fillRect/>
+          </a:stretch>
+        </p:blipFill>
+        <p:spPr>
+          <a:xfrm>
+            <a:off x="1439899" y="5403173"/>
+            <a:ext cx="376983" cy="268077"/>
+          </a:xfrm>
+          <a:prstGeom prst="rect">
+            <a:avLst/>
+          </a:prstGeom>
+        </p:spPr>
+      </p:pic>
+      <p:pic>
+        <p:nvPicPr>
+          <p:cNvPr id="9" name="Picture 8" descr="latex-image-1.pdf"/>
+          <p:cNvPicPr>
+            <a:picLocks noChangeAspect="1"/>
+          </p:cNvPicPr>
+          <p:nvPr/>
+        </p:nvPicPr>
+        <p:blipFill>
+          <a:blip r:embed="rId7">
+            <a:extLst>
+              <a:ext uri="{28A0092B-C50C-407E-A947-70E740481C1C}">
+                <a14:useLocalDpi xmlns:a14="http://schemas.microsoft.com/office/drawing/2010/main" val="0"/>
+              </a:ext>
+            </a:extLst>
+          </a:blip>
+          <a:stretch>
+            <a:fillRect/>
+          </a:stretch>
+        </p:blipFill>
+        <p:spPr>
+          <a:xfrm>
+            <a:off x="6443931" y="5319154"/>
+            <a:ext cx="339399" cy="358980"/>
+          </a:xfrm>
+          <a:prstGeom prst="rect">
+            <a:avLst/>
+          </a:prstGeom>
+        </p:spPr>
+      </p:pic>
+      <p:pic>
+        <p:nvPicPr>
+          <p:cNvPr id="11" name="Picture 10" descr="latex-image-1.pdf"/>
+          <p:cNvPicPr>
+            <a:picLocks noChangeAspect="1"/>
+          </p:cNvPicPr>
+          <p:nvPr/>
+        </p:nvPicPr>
+        <p:blipFill>
+          <a:blip r:embed="rId8">
+            <a:extLst>
+              <a:ext uri="{28A0092B-C50C-407E-A947-70E740481C1C}">
+                <a14:useLocalDpi xmlns:a14="http://schemas.microsoft.com/office/drawing/2010/main" val="0"/>
+              </a:ext>
+            </a:extLst>
+          </a:blip>
+          <a:stretch>
+            <a:fillRect/>
+          </a:stretch>
+        </p:blipFill>
+        <p:spPr>
+          <a:xfrm>
+            <a:off x="3156056" y="5803871"/>
+            <a:ext cx="8545559" cy="304872"/>
+          </a:xfrm>
+          <a:prstGeom prst="rect">
+            <a:avLst/>
+          </a:prstGeom>
+        </p:spPr>
+      </p:pic>
+      <p:pic>
+        <p:nvPicPr>
+          <p:cNvPr id="12" name="Picture 11" descr="latex-image-1.pdf"/>
+          <p:cNvPicPr>
+            <a:picLocks noChangeAspect="1"/>
+          </p:cNvPicPr>
+          <p:nvPr/>
+        </p:nvPicPr>
+        <p:blipFill>
+          <a:blip r:embed="rId9">
+            <a:extLst>
+              <a:ext uri="{28A0092B-C50C-407E-A947-70E740481C1C}">
+                <a14:useLocalDpi xmlns:a14="http://schemas.microsoft.com/office/drawing/2010/main" val="0"/>
+              </a:ext>
+            </a:extLst>
+          </a:blip>
+          <a:stretch>
+            <a:fillRect/>
+          </a:stretch>
+        </p:blipFill>
+        <p:spPr>
+          <a:xfrm>
+            <a:off x="1747776" y="6201962"/>
+            <a:ext cx="2592131" cy="350719"/>
           </a:xfrm>
           <a:prstGeom prst="rect">
             <a:avLst/>
@@ -8285,7 +8474,7 @@
         <p:spPr>
           <a:xfrm>
             <a:off x="609600" y="1752601"/>
-            <a:ext cx="10972800" cy="4373563"/>
+            <a:ext cx="10972800" cy="4912061"/>
           </a:xfrm>
         </p:spPr>
         <p:txBody>
@@ -8346,14 +8535,26 @@
             </a:pPr>
             <a:r>
               <a:rPr lang="en-US" dirty="0" smtClean="0"/>
-              <a:t>Problem:</a:t>
+              <a:t>Problem</a:t>
+            </a:r>
+            <a:r>
+              <a:rPr lang="en-US" dirty="0" smtClean="0"/>
+              <a:t>:</a:t>
             </a:r>
           </a:p>
           <a:p>
             <a:pPr marL="0" indent="0">
               <a:buNone/>
             </a:pPr>
-            <a:endParaRPr lang="en-US" dirty="0"/>
+            <a:r>
+              <a:rPr lang="en-US" dirty="0"/>
+              <a:t>	</a:t>
+            </a:r>
+            <a:r>
+              <a:rPr lang="en-US" dirty="0" smtClean="0"/>
+              <a:t>If	   , then </a:t>
+            </a:r>
+            <a:endParaRPr lang="en-US" dirty="0" smtClean="0"/>
           </a:p>
           <a:p>
             <a:pPr marL="0" indent="0">
@@ -8398,7 +8599,7 @@
       </p:sp>
       <p:pic>
         <p:nvPicPr>
-          <p:cNvPr id="3" name="Picture 2" descr="latex-image-1.pdf"/>
+          <p:cNvPr id="4" name="Picture 3" descr="latex-image-1.pdf"/>
           <p:cNvPicPr>
             <a:picLocks noChangeAspect="1"/>
           </p:cNvPicPr>
@@ -8418,8 +8619,8 @@
         </p:blipFill>
         <p:spPr>
           <a:xfrm>
-            <a:off x="1475268" y="4263321"/>
-            <a:ext cx="7665981" cy="817291"/>
+            <a:off x="7783265" y="2200543"/>
+            <a:ext cx="2306120" cy="389871"/>
           </a:xfrm>
           <a:prstGeom prst="rect">
             <a:avLst/>
@@ -8428,7 +8629,7 @@
       </p:pic>
       <p:pic>
         <p:nvPicPr>
-          <p:cNvPr id="4" name="Picture 3" descr="latex-image-1.pdf"/>
+          <p:cNvPr id="5" name="Picture 4" descr="latex-image-1.pdf"/>
           <p:cNvPicPr>
             <a:picLocks noChangeAspect="1"/>
           </p:cNvPicPr>
@@ -8448,8 +8649,8 @@
         </p:blipFill>
         <p:spPr>
           <a:xfrm>
-            <a:off x="7783265" y="2200543"/>
-            <a:ext cx="2306120" cy="389871"/>
+            <a:off x="2062124" y="3058551"/>
+            <a:ext cx="5716141" cy="500127"/>
           </a:xfrm>
           <a:prstGeom prst="rect">
             <a:avLst/>
@@ -8458,14 +8659,14 @@
       </p:pic>
       <p:pic>
         <p:nvPicPr>
-          <p:cNvPr id="5" name="Picture 4" descr="latex-image-1.pdf"/>
+          <p:cNvPr id="6" name="Picture 5" descr="latex-image-1.pdf"/>
           <p:cNvPicPr>
             <a:picLocks noChangeAspect="1"/>
           </p:cNvPicPr>
           <p:nvPr/>
         </p:nvPicPr>
         <p:blipFill>
-          <a:blip r:embed="rId4" cstate="print">
+          <a:blip r:embed="rId4">
             <a:extLst>
               <a:ext uri="{28A0092B-C50C-407E-A947-70E740481C1C}">
                 <a14:useLocalDpi xmlns:a14="http://schemas.microsoft.com/office/drawing/2010/main" val="0"/>
@@ -8478,8 +8679,38 @@
         </p:blipFill>
         <p:spPr>
           <a:xfrm>
-            <a:off x="2062124" y="3058551"/>
-            <a:ext cx="5716141" cy="500127"/>
+            <a:off x="1923875" y="4551083"/>
+            <a:ext cx="792095" cy="238713"/>
+          </a:xfrm>
+          <a:prstGeom prst="rect">
+            <a:avLst/>
+          </a:prstGeom>
+        </p:spPr>
+      </p:pic>
+      <p:pic>
+        <p:nvPicPr>
+          <p:cNvPr id="10" name="Picture 9" descr="latex-image-1.pdf"/>
+          <p:cNvPicPr>
+            <a:picLocks noChangeAspect="1"/>
+          </p:cNvPicPr>
+          <p:nvPr/>
+        </p:nvPicPr>
+        <p:blipFill>
+          <a:blip r:embed="rId5">
+            <a:extLst>
+              <a:ext uri="{28A0092B-C50C-407E-A947-70E740481C1C}">
+                <a14:useLocalDpi xmlns:a14="http://schemas.microsoft.com/office/drawing/2010/main" val="0"/>
+              </a:ext>
+            </a:extLst>
+          </a:blip>
+          <a:stretch>
+            <a:fillRect/>
+          </a:stretch>
+        </p:blipFill>
+        <p:spPr>
+          <a:xfrm>
+            <a:off x="3809901" y="4241795"/>
+            <a:ext cx="7448645" cy="808513"/>
           </a:xfrm>
           <a:prstGeom prst="rect">
             <a:avLst/>
@@ -9056,15 +9287,7 @@
             </a:r>
             <a:r>
               <a:rPr lang="en-US" dirty="0" smtClean="0"/>
-              <a:t>    </a:t>
-            </a:r>
-            <a:r>
-              <a:rPr lang="en-US" dirty="0" smtClean="0"/>
-              <a:t>, </a:t>
-            </a:r>
-            <a:r>
-              <a:rPr lang="en-US" dirty="0" smtClean="0"/>
-              <a:t>we can construct any curve.</a:t>
+              <a:t>    , we can construct any curve.</a:t>
             </a:r>
           </a:p>
         </p:txBody>

</xml_diff>